<commit_message>
Mudança no console quando registra no banco da API AWS
</commit_message>
<xml_diff>
--- a/Documentação/Apresentação/SPRINT-2sem-03.pptx
+++ b/Documentação/Apresentação/SPRINT-2sem-03.pptx
@@ -224,7 +224,7 @@
           <a:p>
             <a:fld id="{A16AB2ED-1336-44A6-A234-81CBA8E79B13}" type="datetimeFigureOut">
               <a:rPr lang="pt-BR" smtClean="0"/>
-              <a:t>12/12/2020</a:t>
+              <a:t>13/12/2020</a:t>
             </a:fld>
             <a:endParaRPr lang="pt-BR"/>
           </a:p>
@@ -466,7 +466,7 @@
           <a:p>
             <a:fld id="{84539BEB-3F62-43AF-B85C-9C6F6BC99164}" type="datetimeFigureOut">
               <a:rPr lang="pt-BR" smtClean="0"/>
-              <a:t>12/12/2020</a:t>
+              <a:t>13/12/2020</a:t>
             </a:fld>
             <a:endParaRPr lang="pt-BR"/>
           </a:p>
@@ -754,7 +754,7 @@
           <a:p>
             <a:fld id="{84539BEB-3F62-43AF-B85C-9C6F6BC99164}" type="datetimeFigureOut">
               <a:rPr lang="pt-BR" smtClean="0"/>
-              <a:t>12/12/2020</a:t>
+              <a:t>13/12/2020</a:t>
             </a:fld>
             <a:endParaRPr lang="pt-BR"/>
           </a:p>
@@ -952,7 +952,7 @@
           <a:p>
             <a:fld id="{84539BEB-3F62-43AF-B85C-9C6F6BC99164}" type="datetimeFigureOut">
               <a:rPr lang="pt-BR" smtClean="0"/>
-              <a:t>12/12/2020</a:t>
+              <a:t>13/12/2020</a:t>
             </a:fld>
             <a:endParaRPr lang="pt-BR"/>
           </a:p>
@@ -1160,7 +1160,7 @@
           <a:p>
             <a:fld id="{84539BEB-3F62-43AF-B85C-9C6F6BC99164}" type="datetimeFigureOut">
               <a:rPr lang="pt-BR" smtClean="0"/>
-              <a:t>12/12/2020</a:t>
+              <a:t>13/12/2020</a:t>
             </a:fld>
             <a:endParaRPr lang="pt-BR"/>
           </a:p>
@@ -1746,7 +1746,7 @@
           <a:p>
             <a:fld id="{84539BEB-3F62-43AF-B85C-9C6F6BC99164}" type="datetimeFigureOut">
               <a:rPr lang="pt-BR" smtClean="0"/>
-              <a:t>12/12/2020</a:t>
+              <a:t>13/12/2020</a:t>
             </a:fld>
             <a:endParaRPr lang="pt-BR"/>
           </a:p>
@@ -1887,7 +1887,7 @@
           <a:p>
             <a:fld id="{84539BEB-3F62-43AF-B85C-9C6F6BC99164}" type="datetimeFigureOut">
               <a:rPr lang="pt-BR" smtClean="0"/>
-              <a:t>12/12/2020</a:t>
+              <a:t>13/12/2020</a:t>
             </a:fld>
             <a:endParaRPr lang="pt-BR"/>
           </a:p>
@@ -2162,7 +2162,7 @@
           <a:p>
             <a:fld id="{84539BEB-3F62-43AF-B85C-9C6F6BC99164}" type="datetimeFigureOut">
               <a:rPr lang="pt-BR" smtClean="0"/>
-              <a:t>12/12/2020</a:t>
+              <a:t>13/12/2020</a:t>
             </a:fld>
             <a:endParaRPr lang="pt-BR"/>
           </a:p>
@@ -2427,7 +2427,7 @@
           <a:p>
             <a:fld id="{84539BEB-3F62-43AF-B85C-9C6F6BC99164}" type="datetimeFigureOut">
               <a:rPr lang="pt-BR" smtClean="0"/>
-              <a:t>12/12/2020</a:t>
+              <a:t>13/12/2020</a:t>
             </a:fld>
             <a:endParaRPr lang="pt-BR"/>
           </a:p>
@@ -2839,7 +2839,7 @@
           <a:p>
             <a:fld id="{84539BEB-3F62-43AF-B85C-9C6F6BC99164}" type="datetimeFigureOut">
               <a:rPr lang="pt-BR" smtClean="0"/>
-              <a:t>12/12/2020</a:t>
+              <a:t>13/12/2020</a:t>
             </a:fld>
             <a:endParaRPr lang="pt-BR"/>
           </a:p>
@@ -2980,7 +2980,7 @@
           <a:p>
             <a:fld id="{84539BEB-3F62-43AF-B85C-9C6F6BC99164}" type="datetimeFigureOut">
               <a:rPr lang="pt-BR" smtClean="0"/>
-              <a:t>12/12/2020</a:t>
+              <a:t>13/12/2020</a:t>
             </a:fld>
             <a:endParaRPr lang="pt-BR"/>
           </a:p>
@@ -3093,7 +3093,7 @@
           <a:p>
             <a:fld id="{84539BEB-3F62-43AF-B85C-9C6F6BC99164}" type="datetimeFigureOut">
               <a:rPr lang="pt-BR" smtClean="0"/>
-              <a:t>12/12/2020</a:t>
+              <a:t>13/12/2020</a:t>
             </a:fld>
             <a:endParaRPr lang="pt-BR"/>
           </a:p>
@@ -3404,7 +3404,7 @@
           <a:p>
             <a:fld id="{84539BEB-3F62-43AF-B85C-9C6F6BC99164}" type="datetimeFigureOut">
               <a:rPr lang="pt-BR" smtClean="0"/>
-              <a:t>12/12/2020</a:t>
+              <a:t>13/12/2020</a:t>
             </a:fld>
             <a:endParaRPr lang="pt-BR"/>
           </a:p>
@@ -3657,7 +3657,7 @@
           <a:p>
             <a:fld id="{84539BEB-3F62-43AF-B85C-9C6F6BC99164}" type="datetimeFigureOut">
               <a:rPr lang="pt-BR" smtClean="0"/>
-              <a:t>12/12/2020</a:t>
+              <a:t>13/12/2020</a:t>
             </a:fld>
             <a:endParaRPr lang="pt-BR"/>
           </a:p>
@@ -11651,8 +11651,8 @@
         </p:blipFill>
         <p:spPr>
           <a:xfrm>
-            <a:off x="204537" y="18796"/>
-            <a:ext cx="14221326" cy="7999495"/>
+            <a:off x="204538" y="18796"/>
+            <a:ext cx="14221324" cy="7999495"/>
           </a:xfrm>
           <a:prstGeom prst="rect">
             <a:avLst/>

</xml_diff>

<commit_message>
Slide de Diagrama da Solução concluido
</commit_message>
<xml_diff>
--- a/Documentação/Apresentação/SPRINT-2sem-03.pptx
+++ b/Documentação/Apresentação/SPRINT-2sem-03.pptx
@@ -11348,7 +11348,7 @@
         </p:blipFill>
         <p:spPr>
           <a:xfrm>
-            <a:off x="1126844" y="864535"/>
+            <a:off x="5600277" y="-5489878"/>
             <a:ext cx="3429771" cy="5489878"/>
           </a:xfrm>
           <a:prstGeom prst="rect">
@@ -11378,7 +11378,7 @@
         </p:blipFill>
         <p:spPr>
           <a:xfrm>
-            <a:off x="5600277" y="781509"/>
+            <a:off x="5600277" y="-5655930"/>
             <a:ext cx="3429846" cy="5490000"/>
           </a:xfrm>
           <a:prstGeom prst="rect">
@@ -11407,7 +11407,7 @@
         </p:blipFill>
         <p:spPr>
           <a:xfrm>
-            <a:off x="10073785" y="864414"/>
+            <a:off x="5600277" y="-5489878"/>
             <a:ext cx="3429846" cy="5489998"/>
           </a:xfrm>
           <a:prstGeom prst="rect">
@@ -11554,6 +11554,635 @@
   <p:transition spd="slow">
     <p:push dir="u"/>
   </p:transition>
+  <p:timing>
+    <p:tnLst>
+      <p:par>
+        <p:cTn id="1" dur="indefinite" restart="never" nodeType="tmRoot">
+          <p:childTnLst>
+            <p:seq concurrent="1" nextAc="seek">
+              <p:cTn id="2" dur="indefinite" nodeType="mainSeq">
+                <p:childTnLst>
+                  <p:par>
+                    <p:cTn id="3" fill="hold">
+                      <p:stCondLst>
+                        <p:cond delay="indefinite"/>
+                        <p:cond evt="onBegin" delay="0">
+                          <p:tn val="2"/>
+                        </p:cond>
+                      </p:stCondLst>
+                      <p:childTnLst>
+                        <p:par>
+                          <p:cTn id="4" fill="hold">
+                            <p:stCondLst>
+                              <p:cond delay="0"/>
+                            </p:stCondLst>
+                            <p:childTnLst>
+                              <p:par>
+                                <p:cTn id="5" presetID="42" presetClass="path" presetSubtype="0" decel="100000" fill="hold" nodeType="withEffect">
+                                  <p:stCondLst>
+                                    <p:cond delay="0"/>
+                                  </p:stCondLst>
+                                  <p:childTnLst>
+                                    <p:animMotion origin="layout" path="M 0 -3.76543E-6 L -0.30284 0.77219 " pathEditMode="relative" rAng="0" ptsTypes="AA">
+                                      <p:cBhvr>
+                                        <p:cTn id="6" dur="1000" fill="hold"/>
+                                        <p:tgtEl>
+                                          <p:spTgt spid="8"/>
+                                        </p:tgtEl>
+                                        <p:attrNameLst>
+                                          <p:attrName>ppt_x</p:attrName>
+                                          <p:attrName>ppt_y</p:attrName>
+                                        </p:attrNameLst>
+                                      </p:cBhvr>
+                                      <p:rCtr x="-15148" y="38600"/>
+                                    </p:animMotion>
+                                  </p:childTnLst>
+                                </p:cTn>
+                              </p:par>
+                              <p:par>
+                                <p:cTn id="7" presetID="10" presetClass="entr" presetSubtype="0" fill="hold" nodeType="withEffect">
+                                  <p:stCondLst>
+                                    <p:cond delay="0"/>
+                                  </p:stCondLst>
+                                  <p:childTnLst>
+                                    <p:set>
+                                      <p:cBhvr>
+                                        <p:cTn id="8" dur="1" fill="hold">
+                                          <p:stCondLst>
+                                            <p:cond delay="0"/>
+                                          </p:stCondLst>
+                                        </p:cTn>
+                                        <p:tgtEl>
+                                          <p:spTgt spid="8"/>
+                                        </p:tgtEl>
+                                        <p:attrNameLst>
+                                          <p:attrName>style.visibility</p:attrName>
+                                        </p:attrNameLst>
+                                      </p:cBhvr>
+                                      <p:to>
+                                        <p:strVal val="visible"/>
+                                      </p:to>
+                                    </p:set>
+                                    <p:animEffect transition="in" filter="fade">
+                                      <p:cBhvr>
+                                        <p:cTn id="9" dur="1000"/>
+                                        <p:tgtEl>
+                                          <p:spTgt spid="8"/>
+                                        </p:tgtEl>
+                                      </p:cBhvr>
+                                    </p:animEffect>
+                                  </p:childTnLst>
+                                </p:cTn>
+                              </p:par>
+                              <p:par>
+                                <p:cTn id="10" presetID="42" presetClass="path" presetSubtype="0" decel="100000" fill="hold" nodeType="withEffect">
+                                  <p:stCondLst>
+                                    <p:cond delay="500"/>
+                                  </p:stCondLst>
+                                  <p:childTnLst>
+                                    <p:animMotion origin="layout" path="M 0 8.64198E-7 L 0 0.78106 " pathEditMode="relative" rAng="0" ptsTypes="AA">
+                                      <p:cBhvr>
+                                        <p:cTn id="11" dur="1000" fill="hold"/>
+                                        <p:tgtEl>
+                                          <p:spTgt spid="10"/>
+                                        </p:tgtEl>
+                                        <p:attrNameLst>
+                                          <p:attrName>ppt_x</p:attrName>
+                                          <p:attrName>ppt_y</p:attrName>
+                                        </p:attrNameLst>
+                                      </p:cBhvr>
+                                      <p:rCtr x="0" y="39043"/>
+                                    </p:animMotion>
+                                  </p:childTnLst>
+                                </p:cTn>
+                              </p:par>
+                              <p:par>
+                                <p:cTn id="12" presetID="10" presetClass="entr" presetSubtype="0" fill="hold" nodeType="withEffect">
+                                  <p:stCondLst>
+                                    <p:cond delay="500"/>
+                                  </p:stCondLst>
+                                  <p:childTnLst>
+                                    <p:set>
+                                      <p:cBhvr>
+                                        <p:cTn id="13" dur="1" fill="hold">
+                                          <p:stCondLst>
+                                            <p:cond delay="0"/>
+                                          </p:stCondLst>
+                                        </p:cTn>
+                                        <p:tgtEl>
+                                          <p:spTgt spid="10"/>
+                                        </p:tgtEl>
+                                        <p:attrNameLst>
+                                          <p:attrName>style.visibility</p:attrName>
+                                        </p:attrNameLst>
+                                      </p:cBhvr>
+                                      <p:to>
+                                        <p:strVal val="visible"/>
+                                      </p:to>
+                                    </p:set>
+                                    <p:animEffect transition="in" filter="fade">
+                                      <p:cBhvr>
+                                        <p:cTn id="14" dur="1000"/>
+                                        <p:tgtEl>
+                                          <p:spTgt spid="10"/>
+                                        </p:tgtEl>
+                                      </p:cBhvr>
+                                    </p:animEffect>
+                                  </p:childTnLst>
+                                </p:cTn>
+                              </p:par>
+                              <p:par>
+                                <p:cTn id="15" presetID="42" presetClass="path" presetSubtype="0" decel="100000" fill="hold" nodeType="withEffect">
+                                  <p:stCondLst>
+                                    <p:cond delay="1000"/>
+                                  </p:stCondLst>
+                                  <p:childTnLst>
+                                    <p:animMotion origin="layout" path="M 0 -3.76543E-6 L 0.3061 0.7637 " pathEditMode="relative" rAng="0" ptsTypes="AA">
+                                      <p:cBhvr>
+                                        <p:cTn id="16" dur="1000" fill="hold"/>
+                                        <p:tgtEl>
+                                          <p:spTgt spid="12"/>
+                                        </p:tgtEl>
+                                        <p:attrNameLst>
+                                          <p:attrName>ppt_x</p:attrName>
+                                          <p:attrName>ppt_y</p:attrName>
+                                        </p:attrNameLst>
+                                      </p:cBhvr>
+                                      <p:rCtr x="15299" y="38175"/>
+                                    </p:animMotion>
+                                  </p:childTnLst>
+                                </p:cTn>
+                              </p:par>
+                              <p:par>
+                                <p:cTn id="17" presetID="10" presetClass="entr" presetSubtype="0" fill="hold" nodeType="withEffect">
+                                  <p:stCondLst>
+                                    <p:cond delay="1000"/>
+                                  </p:stCondLst>
+                                  <p:childTnLst>
+                                    <p:set>
+                                      <p:cBhvr>
+                                        <p:cTn id="18" dur="1" fill="hold">
+                                          <p:stCondLst>
+                                            <p:cond delay="0"/>
+                                          </p:stCondLst>
+                                        </p:cTn>
+                                        <p:tgtEl>
+                                          <p:spTgt spid="12"/>
+                                        </p:tgtEl>
+                                        <p:attrNameLst>
+                                          <p:attrName>style.visibility</p:attrName>
+                                        </p:attrNameLst>
+                                      </p:cBhvr>
+                                      <p:to>
+                                        <p:strVal val="visible"/>
+                                      </p:to>
+                                    </p:set>
+                                    <p:animEffect transition="in" filter="fade">
+                                      <p:cBhvr>
+                                        <p:cTn id="19" dur="1000"/>
+                                        <p:tgtEl>
+                                          <p:spTgt spid="12"/>
+                                        </p:tgtEl>
+                                      </p:cBhvr>
+                                    </p:animEffect>
+                                  </p:childTnLst>
+                                </p:cTn>
+                              </p:par>
+                            </p:childTnLst>
+                          </p:cTn>
+                        </p:par>
+                        <p:par>
+                          <p:cTn id="20" fill="hold">
+                            <p:stCondLst>
+                              <p:cond delay="2000"/>
+                            </p:stCondLst>
+                            <p:childTnLst>
+                              <p:par>
+                                <p:cTn id="21" presetID="10" presetClass="entr" presetSubtype="0" fill="hold" grpId="0" nodeType="afterEffect">
+                                  <p:stCondLst>
+                                    <p:cond delay="0"/>
+                                  </p:stCondLst>
+                                  <p:childTnLst>
+                                    <p:set>
+                                      <p:cBhvr>
+                                        <p:cTn id="22" dur="1" fill="hold">
+                                          <p:stCondLst>
+                                            <p:cond delay="0"/>
+                                          </p:stCondLst>
+                                        </p:cTn>
+                                        <p:tgtEl>
+                                          <p:spTgt spid="13"/>
+                                        </p:tgtEl>
+                                        <p:attrNameLst>
+                                          <p:attrName>style.visibility</p:attrName>
+                                        </p:attrNameLst>
+                                      </p:cBhvr>
+                                      <p:to>
+                                        <p:strVal val="visible"/>
+                                      </p:to>
+                                    </p:set>
+                                    <p:animEffect transition="in" filter="fade">
+                                      <p:cBhvr>
+                                        <p:cTn id="23" dur="250"/>
+                                        <p:tgtEl>
+                                          <p:spTgt spid="13"/>
+                                        </p:tgtEl>
+                                      </p:cBhvr>
+                                    </p:animEffect>
+                                  </p:childTnLst>
+                                </p:cTn>
+                              </p:par>
+                            </p:childTnLst>
+                          </p:cTn>
+                        </p:par>
+                        <p:par>
+                          <p:cTn id="24" fill="hold">
+                            <p:stCondLst>
+                              <p:cond delay="2250"/>
+                            </p:stCondLst>
+                            <p:childTnLst>
+                              <p:par>
+                                <p:cTn id="25" presetID="10" presetClass="exit" presetSubtype="0" fill="hold" grpId="1" nodeType="afterEffect">
+                                  <p:stCondLst>
+                                    <p:cond delay="0"/>
+                                  </p:stCondLst>
+                                  <p:childTnLst>
+                                    <p:animEffect transition="out" filter="fade">
+                                      <p:cBhvr>
+                                        <p:cTn id="26" dur="100"/>
+                                        <p:tgtEl>
+                                          <p:spTgt spid="13"/>
+                                        </p:tgtEl>
+                                      </p:cBhvr>
+                                    </p:animEffect>
+                                    <p:set>
+                                      <p:cBhvr>
+                                        <p:cTn id="27" dur="1" fill="hold">
+                                          <p:stCondLst>
+                                            <p:cond delay="99"/>
+                                          </p:stCondLst>
+                                        </p:cTn>
+                                        <p:tgtEl>
+                                          <p:spTgt spid="13"/>
+                                        </p:tgtEl>
+                                        <p:attrNameLst>
+                                          <p:attrName>style.visibility</p:attrName>
+                                        </p:attrNameLst>
+                                      </p:cBhvr>
+                                      <p:to>
+                                        <p:strVal val="hidden"/>
+                                      </p:to>
+                                    </p:set>
+                                  </p:childTnLst>
+                                </p:cTn>
+                              </p:par>
+                            </p:childTnLst>
+                          </p:cTn>
+                        </p:par>
+                        <p:par>
+                          <p:cTn id="28" fill="hold">
+                            <p:stCondLst>
+                              <p:cond delay="2350"/>
+                            </p:stCondLst>
+                            <p:childTnLst>
+                              <p:par>
+                                <p:cTn id="29" presetID="10" presetClass="entr" presetSubtype="0" fill="hold" grpId="2" nodeType="afterEffect">
+                                  <p:stCondLst>
+                                    <p:cond delay="0"/>
+                                  </p:stCondLst>
+                                  <p:childTnLst>
+                                    <p:set>
+                                      <p:cBhvr>
+                                        <p:cTn id="30" dur="1" fill="hold">
+                                          <p:stCondLst>
+                                            <p:cond delay="0"/>
+                                          </p:stCondLst>
+                                        </p:cTn>
+                                        <p:tgtEl>
+                                          <p:spTgt spid="13"/>
+                                        </p:tgtEl>
+                                        <p:attrNameLst>
+                                          <p:attrName>style.visibility</p:attrName>
+                                        </p:attrNameLst>
+                                      </p:cBhvr>
+                                      <p:to>
+                                        <p:strVal val="visible"/>
+                                      </p:to>
+                                    </p:set>
+                                    <p:animEffect transition="in" filter="fade">
+                                      <p:cBhvr>
+                                        <p:cTn id="31" dur="250"/>
+                                        <p:tgtEl>
+                                          <p:spTgt spid="13"/>
+                                        </p:tgtEl>
+                                      </p:cBhvr>
+                                    </p:animEffect>
+                                  </p:childTnLst>
+                                </p:cTn>
+                              </p:par>
+                            </p:childTnLst>
+                          </p:cTn>
+                        </p:par>
+                        <p:par>
+                          <p:cTn id="32" fill="hold">
+                            <p:stCondLst>
+                              <p:cond delay="2600"/>
+                            </p:stCondLst>
+                            <p:childTnLst>
+                              <p:par>
+                                <p:cTn id="33" presetID="10" presetClass="entr" presetSubtype="0" fill="hold" grpId="0" nodeType="afterEffect">
+                                  <p:stCondLst>
+                                    <p:cond delay="0"/>
+                                  </p:stCondLst>
+                                  <p:childTnLst>
+                                    <p:set>
+                                      <p:cBhvr>
+                                        <p:cTn id="34" dur="1" fill="hold">
+                                          <p:stCondLst>
+                                            <p:cond delay="0"/>
+                                          </p:stCondLst>
+                                        </p:cTn>
+                                        <p:tgtEl>
+                                          <p:spTgt spid="14"/>
+                                        </p:tgtEl>
+                                        <p:attrNameLst>
+                                          <p:attrName>style.visibility</p:attrName>
+                                        </p:attrNameLst>
+                                      </p:cBhvr>
+                                      <p:to>
+                                        <p:strVal val="visible"/>
+                                      </p:to>
+                                    </p:set>
+                                    <p:animEffect transition="in" filter="fade">
+                                      <p:cBhvr>
+                                        <p:cTn id="35" dur="250"/>
+                                        <p:tgtEl>
+                                          <p:spTgt spid="14"/>
+                                        </p:tgtEl>
+                                      </p:cBhvr>
+                                    </p:animEffect>
+                                  </p:childTnLst>
+                                </p:cTn>
+                              </p:par>
+                            </p:childTnLst>
+                          </p:cTn>
+                        </p:par>
+                        <p:par>
+                          <p:cTn id="36" fill="hold">
+                            <p:stCondLst>
+                              <p:cond delay="2850"/>
+                            </p:stCondLst>
+                            <p:childTnLst>
+                              <p:par>
+                                <p:cTn id="37" presetID="10" presetClass="exit" presetSubtype="0" fill="hold" grpId="1" nodeType="afterEffect">
+                                  <p:stCondLst>
+                                    <p:cond delay="0"/>
+                                  </p:stCondLst>
+                                  <p:childTnLst>
+                                    <p:animEffect transition="out" filter="fade">
+                                      <p:cBhvr>
+                                        <p:cTn id="38" dur="100"/>
+                                        <p:tgtEl>
+                                          <p:spTgt spid="14"/>
+                                        </p:tgtEl>
+                                      </p:cBhvr>
+                                    </p:animEffect>
+                                    <p:set>
+                                      <p:cBhvr>
+                                        <p:cTn id="39" dur="1" fill="hold">
+                                          <p:stCondLst>
+                                            <p:cond delay="99"/>
+                                          </p:stCondLst>
+                                        </p:cTn>
+                                        <p:tgtEl>
+                                          <p:spTgt spid="14"/>
+                                        </p:tgtEl>
+                                        <p:attrNameLst>
+                                          <p:attrName>style.visibility</p:attrName>
+                                        </p:attrNameLst>
+                                      </p:cBhvr>
+                                      <p:to>
+                                        <p:strVal val="hidden"/>
+                                      </p:to>
+                                    </p:set>
+                                  </p:childTnLst>
+                                </p:cTn>
+                              </p:par>
+                            </p:childTnLst>
+                          </p:cTn>
+                        </p:par>
+                        <p:par>
+                          <p:cTn id="40" fill="hold">
+                            <p:stCondLst>
+                              <p:cond delay="2950"/>
+                            </p:stCondLst>
+                            <p:childTnLst>
+                              <p:par>
+                                <p:cTn id="41" presetID="10" presetClass="entr" presetSubtype="0" fill="hold" grpId="2" nodeType="afterEffect">
+                                  <p:stCondLst>
+                                    <p:cond delay="0"/>
+                                  </p:stCondLst>
+                                  <p:childTnLst>
+                                    <p:set>
+                                      <p:cBhvr>
+                                        <p:cTn id="42" dur="1" fill="hold">
+                                          <p:stCondLst>
+                                            <p:cond delay="0"/>
+                                          </p:stCondLst>
+                                        </p:cTn>
+                                        <p:tgtEl>
+                                          <p:spTgt spid="14"/>
+                                        </p:tgtEl>
+                                        <p:attrNameLst>
+                                          <p:attrName>style.visibility</p:attrName>
+                                        </p:attrNameLst>
+                                      </p:cBhvr>
+                                      <p:to>
+                                        <p:strVal val="visible"/>
+                                      </p:to>
+                                    </p:set>
+                                    <p:animEffect transition="in" filter="fade">
+                                      <p:cBhvr>
+                                        <p:cTn id="43" dur="250"/>
+                                        <p:tgtEl>
+                                          <p:spTgt spid="14"/>
+                                        </p:tgtEl>
+                                      </p:cBhvr>
+                                    </p:animEffect>
+                                  </p:childTnLst>
+                                </p:cTn>
+                              </p:par>
+                            </p:childTnLst>
+                          </p:cTn>
+                        </p:par>
+                        <p:par>
+                          <p:cTn id="44" fill="hold">
+                            <p:stCondLst>
+                              <p:cond delay="3200"/>
+                            </p:stCondLst>
+                            <p:childTnLst>
+                              <p:par>
+                                <p:cTn id="45" presetID="10" presetClass="entr" presetSubtype="0" fill="hold" grpId="0" nodeType="afterEffect">
+                                  <p:stCondLst>
+                                    <p:cond delay="0"/>
+                                  </p:stCondLst>
+                                  <p:childTnLst>
+                                    <p:set>
+                                      <p:cBhvr>
+                                        <p:cTn id="46" dur="1" fill="hold">
+                                          <p:stCondLst>
+                                            <p:cond delay="0"/>
+                                          </p:stCondLst>
+                                        </p:cTn>
+                                        <p:tgtEl>
+                                          <p:spTgt spid="15"/>
+                                        </p:tgtEl>
+                                        <p:attrNameLst>
+                                          <p:attrName>style.visibility</p:attrName>
+                                        </p:attrNameLst>
+                                      </p:cBhvr>
+                                      <p:to>
+                                        <p:strVal val="visible"/>
+                                      </p:to>
+                                    </p:set>
+                                    <p:animEffect transition="in" filter="fade">
+                                      <p:cBhvr>
+                                        <p:cTn id="47" dur="250"/>
+                                        <p:tgtEl>
+                                          <p:spTgt spid="15"/>
+                                        </p:tgtEl>
+                                      </p:cBhvr>
+                                    </p:animEffect>
+                                  </p:childTnLst>
+                                </p:cTn>
+                              </p:par>
+                            </p:childTnLst>
+                          </p:cTn>
+                        </p:par>
+                        <p:par>
+                          <p:cTn id="48" fill="hold">
+                            <p:stCondLst>
+                              <p:cond delay="3450"/>
+                            </p:stCondLst>
+                            <p:childTnLst>
+                              <p:par>
+                                <p:cTn id="49" presetID="10" presetClass="exit" presetSubtype="0" fill="hold" grpId="1" nodeType="afterEffect">
+                                  <p:stCondLst>
+                                    <p:cond delay="0"/>
+                                  </p:stCondLst>
+                                  <p:childTnLst>
+                                    <p:animEffect transition="out" filter="fade">
+                                      <p:cBhvr>
+                                        <p:cTn id="50" dur="100"/>
+                                        <p:tgtEl>
+                                          <p:spTgt spid="15"/>
+                                        </p:tgtEl>
+                                      </p:cBhvr>
+                                    </p:animEffect>
+                                    <p:set>
+                                      <p:cBhvr>
+                                        <p:cTn id="51" dur="1" fill="hold">
+                                          <p:stCondLst>
+                                            <p:cond delay="99"/>
+                                          </p:stCondLst>
+                                        </p:cTn>
+                                        <p:tgtEl>
+                                          <p:spTgt spid="15"/>
+                                        </p:tgtEl>
+                                        <p:attrNameLst>
+                                          <p:attrName>style.visibility</p:attrName>
+                                        </p:attrNameLst>
+                                      </p:cBhvr>
+                                      <p:to>
+                                        <p:strVal val="hidden"/>
+                                      </p:to>
+                                    </p:set>
+                                  </p:childTnLst>
+                                </p:cTn>
+                              </p:par>
+                            </p:childTnLst>
+                          </p:cTn>
+                        </p:par>
+                        <p:par>
+                          <p:cTn id="52" fill="hold">
+                            <p:stCondLst>
+                              <p:cond delay="3550"/>
+                            </p:stCondLst>
+                            <p:childTnLst>
+                              <p:par>
+                                <p:cTn id="53" presetID="10" presetClass="entr" presetSubtype="0" fill="hold" grpId="2" nodeType="afterEffect">
+                                  <p:stCondLst>
+                                    <p:cond delay="0"/>
+                                  </p:stCondLst>
+                                  <p:childTnLst>
+                                    <p:set>
+                                      <p:cBhvr>
+                                        <p:cTn id="54" dur="1" fill="hold">
+                                          <p:stCondLst>
+                                            <p:cond delay="0"/>
+                                          </p:stCondLst>
+                                        </p:cTn>
+                                        <p:tgtEl>
+                                          <p:spTgt spid="15"/>
+                                        </p:tgtEl>
+                                        <p:attrNameLst>
+                                          <p:attrName>style.visibility</p:attrName>
+                                        </p:attrNameLst>
+                                      </p:cBhvr>
+                                      <p:to>
+                                        <p:strVal val="visible"/>
+                                      </p:to>
+                                    </p:set>
+                                    <p:animEffect transition="in" filter="fade">
+                                      <p:cBhvr>
+                                        <p:cTn id="55" dur="250"/>
+                                        <p:tgtEl>
+                                          <p:spTgt spid="15"/>
+                                        </p:tgtEl>
+                                      </p:cBhvr>
+                                    </p:animEffect>
+                                  </p:childTnLst>
+                                </p:cTn>
+                              </p:par>
+                            </p:childTnLst>
+                          </p:cTn>
+                        </p:par>
+                      </p:childTnLst>
+                    </p:cTn>
+                  </p:par>
+                </p:childTnLst>
+              </p:cTn>
+              <p:prevCondLst>
+                <p:cond evt="onPrev" delay="0">
+                  <p:tgtEl>
+                    <p:sldTgt/>
+                  </p:tgtEl>
+                </p:cond>
+              </p:prevCondLst>
+              <p:nextCondLst>
+                <p:cond evt="onNext" delay="0">
+                  <p:tgtEl>
+                    <p:sldTgt/>
+                  </p:tgtEl>
+                </p:cond>
+              </p:nextCondLst>
+            </p:seq>
+          </p:childTnLst>
+        </p:cTn>
+      </p:par>
+    </p:tnLst>
+    <p:bldLst>
+      <p:bldP spid="13" grpId="0"/>
+      <p:bldP spid="13" grpId="1"/>
+      <p:bldP spid="13" grpId="2"/>
+      <p:bldP spid="14" grpId="0"/>
+      <p:bldP spid="14" grpId="1"/>
+      <p:bldP spid="14" grpId="2"/>
+      <p:bldP spid="15" grpId="0"/>
+      <p:bldP spid="15" grpId="1"/>
+      <p:bldP spid="15" grpId="2"/>
+    </p:bldLst>
+  </p:timing>
 </p:sld>
 </file>
 
@@ -11576,10 +12205,10 @@
       </p:grpSpPr>
       <p:sp>
         <p:nvSpPr>
-          <p:cNvPr id="4" name="Retângulo 3">
-            <a:extLst>
-              <a:ext uri="{FF2B5EF4-FFF2-40B4-BE49-F238E27FC236}">
-                <a16:creationId xmlns:a16="http://schemas.microsoft.com/office/drawing/2014/main" id="{AE06834C-AFDD-4DD6-8045-6CEE36AFB3CE}"/>
+          <p:cNvPr id="23" name="Retângulo 22">
+            <a:extLst>
+              <a:ext uri="{FF2B5EF4-FFF2-40B4-BE49-F238E27FC236}">
+                <a16:creationId xmlns:a16="http://schemas.microsoft.com/office/drawing/2014/main" id="{DE645220-ABA3-4749-816B-7EE0A7A2F7E2}"/>
               </a:ext>
             </a:extLst>
           </p:cNvPr>
@@ -11588,7 +12217,7 @@
         </p:nvSpPr>
         <p:spPr>
           <a:xfrm>
-            <a:off x="0" y="-165930"/>
+            <a:off x="-5080" y="-159165"/>
             <a:ext cx="14630400" cy="8395529"/>
           </a:xfrm>
           <a:prstGeom prst="rect">
@@ -11630,6 +12259,62 @@
           </a:p>
         </p:txBody>
       </p:sp>
+      <p:sp>
+        <p:nvSpPr>
+          <p:cNvPr id="4" name="Retângulo 3">
+            <a:extLst>
+              <a:ext uri="{FF2B5EF4-FFF2-40B4-BE49-F238E27FC236}">
+                <a16:creationId xmlns:a16="http://schemas.microsoft.com/office/drawing/2014/main" id="{AE06834C-AFDD-4DD6-8045-6CEE36AFB3CE}"/>
+              </a:ext>
+            </a:extLst>
+          </p:cNvPr>
+          <p:cNvSpPr/>
+          <p:nvPr/>
+        </p:nvSpPr>
+        <p:spPr>
+          <a:xfrm>
+            <a:off x="2028305" y="-165930"/>
+            <a:ext cx="14630400" cy="8395529"/>
+          </a:xfrm>
+          <a:prstGeom prst="rect">
+            <a:avLst/>
+          </a:prstGeom>
+          <a:solidFill>
+            <a:schemeClr val="bg1"/>
+          </a:solidFill>
+          <a:ln>
+            <a:noFill/>
+          </a:ln>
+        </p:spPr>
+        <p:style>
+          <a:lnRef idx="2">
+            <a:schemeClr val="accent1">
+              <a:shade val="50000"/>
+            </a:schemeClr>
+          </a:lnRef>
+          <a:fillRef idx="1">
+            <a:schemeClr val="accent1"/>
+          </a:fillRef>
+          <a:effectRef idx="0">
+            <a:schemeClr val="accent1"/>
+          </a:effectRef>
+          <a:fontRef idx="minor">
+            <a:schemeClr val="lt1"/>
+          </a:fontRef>
+        </p:style>
+        <p:txBody>
+          <a:bodyPr rtlCol="0" anchor="ctr"/>
+          <a:lstStyle/>
+          <a:p>
+            <a:pPr algn="ctr"/>
+            <a:r>
+              <a:rPr lang="en-US" dirty="0"/>
+              <a:t> 1</a:t>
+            </a:r>
+            <a:endParaRPr lang="pt-BR" dirty="0"/>
+          </a:p>
+        </p:txBody>
+      </p:sp>
       <p:pic>
         <p:nvPicPr>
           <p:cNvPr id="3" name="Imagem 2">
@@ -11651,14 +12336,863 @@
         </p:blipFill>
         <p:spPr>
           <a:xfrm>
-            <a:off x="204538" y="18796"/>
-            <a:ext cx="14221324" cy="7999495"/>
+            <a:off x="2211138" y="0"/>
+            <a:ext cx="14221324" cy="7999494"/>
           </a:xfrm>
           <a:prstGeom prst="rect">
             <a:avLst/>
           </a:prstGeom>
         </p:spPr>
       </p:pic>
+      <p:pic>
+        <p:nvPicPr>
+          <p:cNvPr id="5" name="Imagem 4">
+            <a:extLst>
+              <a:ext uri="{FF2B5EF4-FFF2-40B4-BE49-F238E27FC236}">
+                <a16:creationId xmlns:a16="http://schemas.microsoft.com/office/drawing/2014/main" id="{BB738613-7076-4C05-9AA9-AE643C83020D}"/>
+              </a:ext>
+            </a:extLst>
+          </p:cNvPr>
+          <p:cNvPicPr>
+            <a:picLocks noChangeAspect="1"/>
+          </p:cNvPicPr>
+          <p:nvPr/>
+        </p:nvPicPr>
+        <p:blipFill>
+          <a:blip r:embed="rId3"/>
+          <a:stretch>
+            <a:fillRect/>
+          </a:stretch>
+        </p:blipFill>
+        <p:spPr>
+          <a:xfrm>
+            <a:off x="8115776" y="1547529"/>
+            <a:ext cx="2422208" cy="1901473"/>
+          </a:xfrm>
+          <a:prstGeom prst="rect">
+            <a:avLst/>
+          </a:prstGeom>
+        </p:spPr>
+      </p:pic>
+      <p:sp>
+        <p:nvSpPr>
+          <p:cNvPr id="6" name="Semicírculo 5">
+            <a:extLst>
+              <a:ext uri="{FF2B5EF4-FFF2-40B4-BE49-F238E27FC236}">
+                <a16:creationId xmlns:a16="http://schemas.microsoft.com/office/drawing/2014/main" id="{DDEEE21B-E164-493A-A91C-B1DDA016F490}"/>
+              </a:ext>
+            </a:extLst>
+          </p:cNvPr>
+          <p:cNvSpPr/>
+          <p:nvPr/>
+        </p:nvSpPr>
+        <p:spPr>
+          <a:xfrm>
+            <a:off x="8873490" y="2565400"/>
+            <a:ext cx="906780" cy="609600"/>
+          </a:xfrm>
+          <a:prstGeom prst="blockArc">
+            <a:avLst/>
+          </a:prstGeom>
+          <a:solidFill>
+            <a:schemeClr val="bg1"/>
+          </a:solidFill>
+          <a:ln>
+            <a:solidFill>
+              <a:schemeClr val="bg1"/>
+            </a:solidFill>
+          </a:ln>
+        </p:spPr>
+        <p:style>
+          <a:lnRef idx="2">
+            <a:schemeClr val="accent1">
+              <a:shade val="50000"/>
+            </a:schemeClr>
+          </a:lnRef>
+          <a:fillRef idx="1">
+            <a:schemeClr val="accent1"/>
+          </a:fillRef>
+          <a:effectRef idx="0">
+            <a:schemeClr val="accent1"/>
+          </a:effectRef>
+          <a:fontRef idx="minor">
+            <a:schemeClr val="lt1"/>
+          </a:fontRef>
+        </p:style>
+        <p:txBody>
+          <a:bodyPr rtlCol="0" anchor="ctr"/>
+          <a:lstStyle/>
+          <a:p>
+            <a:pPr algn="ctr"/>
+            <a:endParaRPr lang="pt-BR">
+              <a:solidFill>
+                <a:schemeClr val="tx1"/>
+              </a:solidFill>
+            </a:endParaRPr>
+          </a:p>
+        </p:txBody>
+      </p:sp>
+      <p:sp>
+        <p:nvSpPr>
+          <p:cNvPr id="7" name="Semicírculo 6">
+            <a:extLst>
+              <a:ext uri="{FF2B5EF4-FFF2-40B4-BE49-F238E27FC236}">
+                <a16:creationId xmlns:a16="http://schemas.microsoft.com/office/drawing/2014/main" id="{4DED90AC-079C-4E2B-B2E9-1AEE9C8ED35B}"/>
+              </a:ext>
+            </a:extLst>
+          </p:cNvPr>
+          <p:cNvSpPr/>
+          <p:nvPr/>
+        </p:nvSpPr>
+        <p:spPr>
+          <a:xfrm>
+            <a:off x="8873490" y="2319020"/>
+            <a:ext cx="906780" cy="609600"/>
+          </a:xfrm>
+          <a:prstGeom prst="blockArc">
+            <a:avLst/>
+          </a:prstGeom>
+          <a:solidFill>
+            <a:schemeClr val="bg1"/>
+          </a:solidFill>
+          <a:ln>
+            <a:solidFill>
+              <a:schemeClr val="bg1"/>
+            </a:solidFill>
+          </a:ln>
+        </p:spPr>
+        <p:style>
+          <a:lnRef idx="2">
+            <a:schemeClr val="accent1">
+              <a:shade val="50000"/>
+            </a:schemeClr>
+          </a:lnRef>
+          <a:fillRef idx="1">
+            <a:schemeClr val="accent1"/>
+          </a:fillRef>
+          <a:effectRef idx="0">
+            <a:schemeClr val="accent1"/>
+          </a:effectRef>
+          <a:fontRef idx="minor">
+            <a:schemeClr val="lt1"/>
+          </a:fontRef>
+        </p:style>
+        <p:txBody>
+          <a:bodyPr rtlCol="0" anchor="ctr"/>
+          <a:lstStyle/>
+          <a:p>
+            <a:pPr algn="ctr"/>
+            <a:endParaRPr lang="pt-BR">
+              <a:solidFill>
+                <a:schemeClr val="tx1"/>
+              </a:solidFill>
+            </a:endParaRPr>
+          </a:p>
+        </p:txBody>
+      </p:sp>
+      <p:sp>
+        <p:nvSpPr>
+          <p:cNvPr id="9" name="Retângulo 8">
+            <a:extLst>
+              <a:ext uri="{FF2B5EF4-FFF2-40B4-BE49-F238E27FC236}">
+                <a16:creationId xmlns:a16="http://schemas.microsoft.com/office/drawing/2014/main" id="{69CC4C3E-11CD-423E-B7DE-FE0287D122CA}"/>
+              </a:ext>
+            </a:extLst>
+          </p:cNvPr>
+          <p:cNvSpPr/>
+          <p:nvPr/>
+        </p:nvSpPr>
+        <p:spPr>
+          <a:xfrm>
+            <a:off x="9166860" y="2727960"/>
+            <a:ext cx="309880" cy="226060"/>
+          </a:xfrm>
+          <a:prstGeom prst="rect">
+            <a:avLst/>
+          </a:prstGeom>
+          <a:solidFill>
+            <a:schemeClr val="bg1"/>
+          </a:solidFill>
+          <a:ln>
+            <a:noFill/>
+          </a:ln>
+        </p:spPr>
+        <p:style>
+          <a:lnRef idx="2">
+            <a:schemeClr val="accent1">
+              <a:shade val="50000"/>
+            </a:schemeClr>
+          </a:lnRef>
+          <a:fillRef idx="1">
+            <a:schemeClr val="accent1"/>
+          </a:fillRef>
+          <a:effectRef idx="0">
+            <a:schemeClr val="accent1"/>
+          </a:effectRef>
+          <a:fontRef idx="minor">
+            <a:schemeClr val="lt1"/>
+          </a:fontRef>
+        </p:style>
+        <p:txBody>
+          <a:bodyPr rtlCol="0" anchor="ctr"/>
+          <a:lstStyle/>
+          <a:p>
+            <a:pPr algn="ctr"/>
+            <a:endParaRPr lang="pt-BR"/>
+          </a:p>
+        </p:txBody>
+      </p:sp>
+      <p:sp>
+        <p:nvSpPr>
+          <p:cNvPr id="10" name="Retângulo 9">
+            <a:extLst>
+              <a:ext uri="{FF2B5EF4-FFF2-40B4-BE49-F238E27FC236}">
+                <a16:creationId xmlns:a16="http://schemas.microsoft.com/office/drawing/2014/main" id="{59B8C024-0416-4024-A87D-2EE1F3362587}"/>
+              </a:ext>
+            </a:extLst>
+          </p:cNvPr>
+          <p:cNvSpPr/>
+          <p:nvPr/>
+        </p:nvSpPr>
+        <p:spPr>
+          <a:xfrm>
+            <a:off x="3116580" y="601980"/>
+            <a:ext cx="3642360" cy="556260"/>
+          </a:xfrm>
+          <a:prstGeom prst="rect">
+            <a:avLst/>
+          </a:prstGeom>
+          <a:solidFill>
+            <a:schemeClr val="bg1"/>
+          </a:solidFill>
+          <a:ln>
+            <a:solidFill>
+              <a:schemeClr val="bg1"/>
+            </a:solidFill>
+          </a:ln>
+        </p:spPr>
+        <p:style>
+          <a:lnRef idx="2">
+            <a:schemeClr val="accent1">
+              <a:shade val="50000"/>
+            </a:schemeClr>
+          </a:lnRef>
+          <a:fillRef idx="1">
+            <a:schemeClr val="accent1"/>
+          </a:fillRef>
+          <a:effectRef idx="0">
+            <a:schemeClr val="accent1"/>
+          </a:effectRef>
+          <a:fontRef idx="minor">
+            <a:schemeClr val="lt1"/>
+          </a:fontRef>
+        </p:style>
+        <p:txBody>
+          <a:bodyPr rtlCol="0" anchor="ctr"/>
+          <a:lstStyle/>
+          <a:p>
+            <a:pPr algn="ctr"/>
+            <a:endParaRPr lang="pt-BR"/>
+          </a:p>
+        </p:txBody>
+      </p:sp>
+      <p:sp>
+        <p:nvSpPr>
+          <p:cNvPr id="11" name="Retângulo 10">
+            <a:extLst>
+              <a:ext uri="{FF2B5EF4-FFF2-40B4-BE49-F238E27FC236}">
+                <a16:creationId xmlns:a16="http://schemas.microsoft.com/office/drawing/2014/main" id="{1B97378C-051A-478E-95DD-5498FA5C441F}"/>
+              </a:ext>
+            </a:extLst>
+          </p:cNvPr>
+          <p:cNvSpPr/>
+          <p:nvPr/>
+        </p:nvSpPr>
+        <p:spPr>
+          <a:xfrm>
+            <a:off x="3116580" y="4386335"/>
+            <a:ext cx="3642360" cy="556260"/>
+          </a:xfrm>
+          <a:prstGeom prst="rect">
+            <a:avLst/>
+          </a:prstGeom>
+          <a:solidFill>
+            <a:schemeClr val="bg1"/>
+          </a:solidFill>
+          <a:ln>
+            <a:solidFill>
+              <a:schemeClr val="bg1"/>
+            </a:solidFill>
+          </a:ln>
+        </p:spPr>
+        <p:style>
+          <a:lnRef idx="2">
+            <a:schemeClr val="accent1">
+              <a:shade val="50000"/>
+            </a:schemeClr>
+          </a:lnRef>
+          <a:fillRef idx="1">
+            <a:schemeClr val="accent1"/>
+          </a:fillRef>
+          <a:effectRef idx="0">
+            <a:schemeClr val="accent1"/>
+          </a:effectRef>
+          <a:fontRef idx="minor">
+            <a:schemeClr val="lt1"/>
+          </a:fontRef>
+        </p:style>
+        <p:txBody>
+          <a:bodyPr rtlCol="0" anchor="ctr"/>
+          <a:lstStyle/>
+          <a:p>
+            <a:pPr algn="ctr"/>
+            <a:endParaRPr lang="pt-BR"/>
+          </a:p>
+        </p:txBody>
+      </p:sp>
+      <p:sp>
+        <p:nvSpPr>
+          <p:cNvPr id="15" name="Retângulo 14">
+            <a:extLst>
+              <a:ext uri="{FF2B5EF4-FFF2-40B4-BE49-F238E27FC236}">
+                <a16:creationId xmlns:a16="http://schemas.microsoft.com/office/drawing/2014/main" id="{E7F97CA2-FEB0-4650-8555-2E1895F04D85}"/>
+              </a:ext>
+            </a:extLst>
+          </p:cNvPr>
+          <p:cNvSpPr/>
+          <p:nvPr/>
+        </p:nvSpPr>
+        <p:spPr>
+          <a:xfrm>
+            <a:off x="4371147" y="1496728"/>
+            <a:ext cx="1166053" cy="667351"/>
+          </a:xfrm>
+          <a:prstGeom prst="rect">
+            <a:avLst/>
+          </a:prstGeom>
+          <a:solidFill>
+            <a:schemeClr val="bg1"/>
+          </a:solidFill>
+          <a:ln>
+            <a:solidFill>
+              <a:schemeClr val="bg1"/>
+            </a:solidFill>
+          </a:ln>
+        </p:spPr>
+        <p:style>
+          <a:lnRef idx="2">
+            <a:schemeClr val="accent1">
+              <a:shade val="50000"/>
+            </a:schemeClr>
+          </a:lnRef>
+          <a:fillRef idx="1">
+            <a:schemeClr val="accent1"/>
+          </a:fillRef>
+          <a:effectRef idx="0">
+            <a:schemeClr val="accent1"/>
+          </a:effectRef>
+          <a:fontRef idx="minor">
+            <a:schemeClr val="lt1"/>
+          </a:fontRef>
+        </p:style>
+        <p:txBody>
+          <a:bodyPr rtlCol="0" anchor="ctr"/>
+          <a:lstStyle/>
+          <a:p>
+            <a:pPr algn="ctr"/>
+            <a:endParaRPr lang="pt-BR"/>
+          </a:p>
+        </p:txBody>
+      </p:sp>
+      <p:sp>
+        <p:nvSpPr>
+          <p:cNvPr id="17" name="Retângulo 16">
+            <a:extLst>
+              <a:ext uri="{FF2B5EF4-FFF2-40B4-BE49-F238E27FC236}">
+                <a16:creationId xmlns:a16="http://schemas.microsoft.com/office/drawing/2014/main" id="{9FA8DC8A-3282-4464-A003-0B66FD05EEC9}"/>
+              </a:ext>
+            </a:extLst>
+          </p:cNvPr>
+          <p:cNvSpPr/>
+          <p:nvPr/>
+        </p:nvSpPr>
+        <p:spPr>
+          <a:xfrm>
+            <a:off x="3030775" y="1184974"/>
+            <a:ext cx="1019935" cy="1426669"/>
+          </a:xfrm>
+          <a:custGeom>
+            <a:avLst/>
+            <a:gdLst>
+              <a:gd name="connsiteX0" fmla="*/ 0 w 961515"/>
+              <a:gd name="connsiteY0" fmla="*/ 0 h 1155968"/>
+              <a:gd name="connsiteX1" fmla="*/ 961515 w 961515"/>
+              <a:gd name="connsiteY1" fmla="*/ 0 h 1155968"/>
+              <a:gd name="connsiteX2" fmla="*/ 961515 w 961515"/>
+              <a:gd name="connsiteY2" fmla="*/ 1155968 h 1155968"/>
+              <a:gd name="connsiteX3" fmla="*/ 0 w 961515"/>
+              <a:gd name="connsiteY3" fmla="*/ 1155968 h 1155968"/>
+              <a:gd name="connsiteX4" fmla="*/ 0 w 961515"/>
+              <a:gd name="connsiteY4" fmla="*/ 0 h 1155968"/>
+              <a:gd name="connsiteX0" fmla="*/ 0 w 1004695"/>
+              <a:gd name="connsiteY0" fmla="*/ 0 h 1290588"/>
+              <a:gd name="connsiteX1" fmla="*/ 961515 w 1004695"/>
+              <a:gd name="connsiteY1" fmla="*/ 0 h 1290588"/>
+              <a:gd name="connsiteX2" fmla="*/ 1004695 w 1004695"/>
+              <a:gd name="connsiteY2" fmla="*/ 1290588 h 1290588"/>
+              <a:gd name="connsiteX3" fmla="*/ 0 w 1004695"/>
+              <a:gd name="connsiteY3" fmla="*/ 1155968 h 1290588"/>
+              <a:gd name="connsiteX4" fmla="*/ 0 w 1004695"/>
+              <a:gd name="connsiteY4" fmla="*/ 0 h 1290588"/>
+              <a:gd name="connsiteX0" fmla="*/ 0 w 1004695"/>
+              <a:gd name="connsiteY0" fmla="*/ 0 h 1426260"/>
+              <a:gd name="connsiteX1" fmla="*/ 961515 w 1004695"/>
+              <a:gd name="connsiteY1" fmla="*/ 0 h 1426260"/>
+              <a:gd name="connsiteX2" fmla="*/ 1004695 w 1004695"/>
+              <a:gd name="connsiteY2" fmla="*/ 1290588 h 1426260"/>
+              <a:gd name="connsiteX3" fmla="*/ 913845 w 1004695"/>
+              <a:gd name="connsiteY3" fmla="*/ 1426145 h 1426260"/>
+              <a:gd name="connsiteX4" fmla="*/ 0 w 1004695"/>
+              <a:gd name="connsiteY4" fmla="*/ 1155968 h 1426260"/>
+              <a:gd name="connsiteX5" fmla="*/ 0 w 1004695"/>
+              <a:gd name="connsiteY5" fmla="*/ 0 h 1426260"/>
+              <a:gd name="connsiteX0" fmla="*/ 0 w 1004695"/>
+              <a:gd name="connsiteY0" fmla="*/ 0 h 1426260"/>
+              <a:gd name="connsiteX1" fmla="*/ 961515 w 1004695"/>
+              <a:gd name="connsiteY1" fmla="*/ 0 h 1426260"/>
+              <a:gd name="connsiteX2" fmla="*/ 1004695 w 1004695"/>
+              <a:gd name="connsiteY2" fmla="*/ 1290588 h 1426260"/>
+              <a:gd name="connsiteX3" fmla="*/ 913845 w 1004695"/>
+              <a:gd name="connsiteY3" fmla="*/ 1426145 h 1426260"/>
+              <a:gd name="connsiteX4" fmla="*/ 352505 w 1004695"/>
+              <a:gd name="connsiteY4" fmla="*/ 1332165 h 1426260"/>
+              <a:gd name="connsiteX5" fmla="*/ 0 w 1004695"/>
+              <a:gd name="connsiteY5" fmla="*/ 1155968 h 1426260"/>
+              <a:gd name="connsiteX6" fmla="*/ 0 w 1004695"/>
+              <a:gd name="connsiteY6" fmla="*/ 0 h 1426260"/>
+              <a:gd name="connsiteX0" fmla="*/ 0 w 1019935"/>
+              <a:gd name="connsiteY0" fmla="*/ 0 h 1426243"/>
+              <a:gd name="connsiteX1" fmla="*/ 961515 w 1019935"/>
+              <a:gd name="connsiteY1" fmla="*/ 0 h 1426243"/>
+              <a:gd name="connsiteX2" fmla="*/ 1019935 w 1019935"/>
+              <a:gd name="connsiteY2" fmla="*/ 1265188 h 1426243"/>
+              <a:gd name="connsiteX3" fmla="*/ 913845 w 1019935"/>
+              <a:gd name="connsiteY3" fmla="*/ 1426145 h 1426243"/>
+              <a:gd name="connsiteX4" fmla="*/ 352505 w 1019935"/>
+              <a:gd name="connsiteY4" fmla="*/ 1332165 h 1426243"/>
+              <a:gd name="connsiteX5" fmla="*/ 0 w 1019935"/>
+              <a:gd name="connsiteY5" fmla="*/ 1155968 h 1426243"/>
+              <a:gd name="connsiteX6" fmla="*/ 0 w 1019935"/>
+              <a:gd name="connsiteY6" fmla="*/ 0 h 1426243"/>
+              <a:gd name="connsiteX0" fmla="*/ 0 w 1019935"/>
+              <a:gd name="connsiteY0" fmla="*/ 0 h 1426669"/>
+              <a:gd name="connsiteX1" fmla="*/ 961515 w 1019935"/>
+              <a:gd name="connsiteY1" fmla="*/ 0 h 1426669"/>
+              <a:gd name="connsiteX2" fmla="*/ 1019935 w 1019935"/>
+              <a:gd name="connsiteY2" fmla="*/ 1265188 h 1426669"/>
+              <a:gd name="connsiteX3" fmla="*/ 913845 w 1019935"/>
+              <a:gd name="connsiteY3" fmla="*/ 1426145 h 1426669"/>
+              <a:gd name="connsiteX4" fmla="*/ 352505 w 1019935"/>
+              <a:gd name="connsiteY4" fmla="*/ 1332165 h 1426669"/>
+              <a:gd name="connsiteX5" fmla="*/ 0 w 1019935"/>
+              <a:gd name="connsiteY5" fmla="*/ 1155968 h 1426669"/>
+              <a:gd name="connsiteX6" fmla="*/ 0 w 1019935"/>
+              <a:gd name="connsiteY6" fmla="*/ 0 h 1426669"/>
+            </a:gdLst>
+            <a:ahLst/>
+            <a:cxnLst>
+              <a:cxn ang="0">
+                <a:pos x="connsiteX0" y="connsiteY0"/>
+              </a:cxn>
+              <a:cxn ang="0">
+                <a:pos x="connsiteX1" y="connsiteY1"/>
+              </a:cxn>
+              <a:cxn ang="0">
+                <a:pos x="connsiteX2" y="connsiteY2"/>
+              </a:cxn>
+              <a:cxn ang="0">
+                <a:pos x="connsiteX3" y="connsiteY3"/>
+              </a:cxn>
+              <a:cxn ang="0">
+                <a:pos x="connsiteX4" y="connsiteY4"/>
+              </a:cxn>
+              <a:cxn ang="0">
+                <a:pos x="connsiteX5" y="connsiteY5"/>
+              </a:cxn>
+              <a:cxn ang="0">
+                <a:pos x="connsiteX6" y="connsiteY6"/>
+              </a:cxn>
+            </a:cxnLst>
+            <a:rect l="l" t="t" r="r" b="b"/>
+            <a:pathLst>
+              <a:path w="1019935" h="1426669">
+                <a:moveTo>
+                  <a:pt x="0" y="0"/>
+                </a:moveTo>
+                <a:lnTo>
+                  <a:pt x="961515" y="0"/>
+                </a:lnTo>
+                <a:lnTo>
+                  <a:pt x="1019935" y="1265188"/>
+                </a:lnTo>
+                <a:cubicBezTo>
+                  <a:pt x="949012" y="1405200"/>
+                  <a:pt x="941588" y="1430913"/>
+                  <a:pt x="913845" y="1426145"/>
+                </a:cubicBezTo>
+                <a:cubicBezTo>
+                  <a:pt x="752978" y="1378732"/>
+                  <a:pt x="513372" y="1379578"/>
+                  <a:pt x="352505" y="1332165"/>
+                </a:cubicBezTo>
+                <a:lnTo>
+                  <a:pt x="0" y="1155968"/>
+                </a:lnTo>
+                <a:lnTo>
+                  <a:pt x="0" y="0"/>
+                </a:lnTo>
+                <a:close/>
+              </a:path>
+            </a:pathLst>
+          </a:custGeom>
+          <a:solidFill>
+            <a:schemeClr val="bg1"/>
+          </a:solidFill>
+          <a:ln>
+            <a:noFill/>
+          </a:ln>
+        </p:spPr>
+        <p:style>
+          <a:lnRef idx="2">
+            <a:schemeClr val="accent1">
+              <a:shade val="50000"/>
+            </a:schemeClr>
+          </a:lnRef>
+          <a:fillRef idx="1">
+            <a:schemeClr val="accent1"/>
+          </a:fillRef>
+          <a:effectRef idx="0">
+            <a:schemeClr val="accent1"/>
+          </a:effectRef>
+          <a:fontRef idx="minor">
+            <a:schemeClr val="lt1"/>
+          </a:fontRef>
+        </p:style>
+        <p:txBody>
+          <a:bodyPr rtlCol="0" anchor="ctr"/>
+          <a:lstStyle/>
+          <a:p>
+            <a:pPr algn="ctr"/>
+            <a:endParaRPr lang="pt-BR"/>
+          </a:p>
+        </p:txBody>
+      </p:sp>
+      <p:sp>
+        <p:nvSpPr>
+          <p:cNvPr id="19" name="Retângulo 18">
+            <a:extLst>
+              <a:ext uri="{FF2B5EF4-FFF2-40B4-BE49-F238E27FC236}">
+                <a16:creationId xmlns:a16="http://schemas.microsoft.com/office/drawing/2014/main" id="{5FA9B005-140E-4CFE-965B-4CDF193C0259}"/>
+              </a:ext>
+            </a:extLst>
+          </p:cNvPr>
+          <p:cNvSpPr/>
+          <p:nvPr/>
+        </p:nvSpPr>
+        <p:spPr>
+          <a:xfrm>
+            <a:off x="3779835" y="2885652"/>
+            <a:ext cx="1294069" cy="667351"/>
+          </a:xfrm>
+          <a:custGeom>
+            <a:avLst/>
+            <a:gdLst>
+              <a:gd name="connsiteX0" fmla="*/ 0 w 1166053"/>
+              <a:gd name="connsiteY0" fmla="*/ 0 h 667351"/>
+              <a:gd name="connsiteX1" fmla="*/ 1166053 w 1166053"/>
+              <a:gd name="connsiteY1" fmla="*/ 0 h 667351"/>
+              <a:gd name="connsiteX2" fmla="*/ 1166053 w 1166053"/>
+              <a:gd name="connsiteY2" fmla="*/ 667351 h 667351"/>
+              <a:gd name="connsiteX3" fmla="*/ 0 w 1166053"/>
+              <a:gd name="connsiteY3" fmla="*/ 667351 h 667351"/>
+              <a:gd name="connsiteX4" fmla="*/ 0 w 1166053"/>
+              <a:gd name="connsiteY4" fmla="*/ 0 h 667351"/>
+              <a:gd name="connsiteX0" fmla="*/ 0 w 1294069"/>
+              <a:gd name="connsiteY0" fmla="*/ 42672 h 667351"/>
+              <a:gd name="connsiteX1" fmla="*/ 1294069 w 1294069"/>
+              <a:gd name="connsiteY1" fmla="*/ 0 h 667351"/>
+              <a:gd name="connsiteX2" fmla="*/ 1294069 w 1294069"/>
+              <a:gd name="connsiteY2" fmla="*/ 667351 h 667351"/>
+              <a:gd name="connsiteX3" fmla="*/ 128016 w 1294069"/>
+              <a:gd name="connsiteY3" fmla="*/ 667351 h 667351"/>
+              <a:gd name="connsiteX4" fmla="*/ 0 w 1294069"/>
+              <a:gd name="connsiteY4" fmla="*/ 42672 h 667351"/>
+            </a:gdLst>
+            <a:ahLst/>
+            <a:cxnLst>
+              <a:cxn ang="0">
+                <a:pos x="connsiteX0" y="connsiteY0"/>
+              </a:cxn>
+              <a:cxn ang="0">
+                <a:pos x="connsiteX1" y="connsiteY1"/>
+              </a:cxn>
+              <a:cxn ang="0">
+                <a:pos x="connsiteX2" y="connsiteY2"/>
+              </a:cxn>
+              <a:cxn ang="0">
+                <a:pos x="connsiteX3" y="connsiteY3"/>
+              </a:cxn>
+              <a:cxn ang="0">
+                <a:pos x="connsiteX4" y="connsiteY4"/>
+              </a:cxn>
+            </a:cxnLst>
+            <a:rect l="l" t="t" r="r" b="b"/>
+            <a:pathLst>
+              <a:path w="1294069" h="667351">
+                <a:moveTo>
+                  <a:pt x="0" y="42672"/>
+                </a:moveTo>
+                <a:lnTo>
+                  <a:pt x="1294069" y="0"/>
+                </a:lnTo>
+                <a:lnTo>
+                  <a:pt x="1294069" y="667351"/>
+                </a:lnTo>
+                <a:lnTo>
+                  <a:pt x="128016" y="667351"/>
+                </a:lnTo>
+                <a:lnTo>
+                  <a:pt x="0" y="42672"/>
+                </a:lnTo>
+                <a:close/>
+              </a:path>
+            </a:pathLst>
+          </a:custGeom>
+          <a:solidFill>
+            <a:schemeClr val="bg1"/>
+          </a:solidFill>
+          <a:ln>
+            <a:solidFill>
+              <a:schemeClr val="bg1"/>
+            </a:solidFill>
+          </a:ln>
+        </p:spPr>
+        <p:style>
+          <a:lnRef idx="2">
+            <a:schemeClr val="accent1">
+              <a:shade val="50000"/>
+            </a:schemeClr>
+          </a:lnRef>
+          <a:fillRef idx="1">
+            <a:schemeClr val="accent1"/>
+          </a:fillRef>
+          <a:effectRef idx="0">
+            <a:schemeClr val="accent1"/>
+          </a:effectRef>
+          <a:fontRef idx="minor">
+            <a:schemeClr val="lt1"/>
+          </a:fontRef>
+        </p:style>
+        <p:txBody>
+          <a:bodyPr rtlCol="0" anchor="ctr"/>
+          <a:lstStyle/>
+          <a:p>
+            <a:pPr algn="ctr"/>
+            <a:endParaRPr lang="pt-BR"/>
+          </a:p>
+        </p:txBody>
+      </p:sp>
+      <p:sp>
+        <p:nvSpPr>
+          <p:cNvPr id="20" name="Retângulo 19">
+            <a:extLst>
+              <a:ext uri="{FF2B5EF4-FFF2-40B4-BE49-F238E27FC236}">
+                <a16:creationId xmlns:a16="http://schemas.microsoft.com/office/drawing/2014/main" id="{5614B4E7-C0E7-4266-844E-9F7F30F6C27B}"/>
+              </a:ext>
+            </a:extLst>
+          </p:cNvPr>
+          <p:cNvSpPr/>
+          <p:nvPr/>
+        </p:nvSpPr>
+        <p:spPr>
+          <a:xfrm flipH="1">
+            <a:off x="4350826" y="5293638"/>
+            <a:ext cx="1166054" cy="660122"/>
+          </a:xfrm>
+          <a:prstGeom prst="rect">
+            <a:avLst/>
+          </a:prstGeom>
+          <a:solidFill>
+            <a:schemeClr val="bg1"/>
+          </a:solidFill>
+          <a:ln>
+            <a:solidFill>
+              <a:schemeClr val="bg1"/>
+            </a:solidFill>
+          </a:ln>
+        </p:spPr>
+        <p:style>
+          <a:lnRef idx="2">
+            <a:schemeClr val="accent1">
+              <a:shade val="50000"/>
+            </a:schemeClr>
+          </a:lnRef>
+          <a:fillRef idx="1">
+            <a:schemeClr val="accent1"/>
+          </a:fillRef>
+          <a:effectRef idx="0">
+            <a:schemeClr val="accent1"/>
+          </a:effectRef>
+          <a:fontRef idx="minor">
+            <a:schemeClr val="lt1"/>
+          </a:fontRef>
+        </p:style>
+        <p:txBody>
+          <a:bodyPr rtlCol="0" anchor="ctr"/>
+          <a:lstStyle/>
+          <a:p>
+            <a:pPr algn="ctr"/>
+            <a:endParaRPr lang="pt-BR"/>
+          </a:p>
+        </p:txBody>
+      </p:sp>
+      <p:pic>
+        <p:nvPicPr>
+          <p:cNvPr id="22" name="Imagem 21">
+            <a:extLst>
+              <a:ext uri="{FF2B5EF4-FFF2-40B4-BE49-F238E27FC236}">
+                <a16:creationId xmlns:a16="http://schemas.microsoft.com/office/drawing/2014/main" id="{CDB4F3CC-B24F-47B9-9D01-6385067D9071}"/>
+              </a:ext>
+            </a:extLst>
+          </p:cNvPr>
+          <p:cNvPicPr>
+            <a:picLocks noChangeAspect="1"/>
+          </p:cNvPicPr>
+          <p:nvPr/>
+        </p:nvPicPr>
+        <p:blipFill>
+          <a:blip r:embed="rId4"/>
+          <a:srcRect/>
+          <a:stretch/>
+        </p:blipFill>
+        <p:spPr>
+          <a:xfrm>
+            <a:off x="3720906" y="6701939"/>
+            <a:ext cx="2466534" cy="1527659"/>
+          </a:xfrm>
+          <a:prstGeom prst="rect">
+            <a:avLst/>
+          </a:prstGeom>
+        </p:spPr>
+      </p:pic>
+      <p:sp>
+        <p:nvSpPr>
+          <p:cNvPr id="24" name="Retângulo 23">
+            <a:extLst>
+              <a:ext uri="{FF2B5EF4-FFF2-40B4-BE49-F238E27FC236}">
+                <a16:creationId xmlns:a16="http://schemas.microsoft.com/office/drawing/2014/main" id="{559D41A0-C00C-434E-B615-5494E1D8DB31}"/>
+              </a:ext>
+            </a:extLst>
+          </p:cNvPr>
+          <p:cNvSpPr/>
+          <p:nvPr/>
+        </p:nvSpPr>
+        <p:spPr>
+          <a:xfrm>
+            <a:off x="10973463" y="-159166"/>
+            <a:ext cx="5464079" cy="8395529"/>
+          </a:xfrm>
+          <a:prstGeom prst="rect">
+            <a:avLst/>
+          </a:prstGeom>
+          <a:solidFill>
+            <a:schemeClr val="bg1"/>
+          </a:solidFill>
+          <a:ln>
+            <a:noFill/>
+          </a:ln>
+        </p:spPr>
+        <p:style>
+          <a:lnRef idx="2">
+            <a:schemeClr val="accent1">
+              <a:shade val="50000"/>
+            </a:schemeClr>
+          </a:lnRef>
+          <a:fillRef idx="1">
+            <a:schemeClr val="accent1"/>
+          </a:fillRef>
+          <a:effectRef idx="0">
+            <a:schemeClr val="accent1"/>
+          </a:effectRef>
+          <a:fontRef idx="minor">
+            <a:schemeClr val="lt1"/>
+          </a:fontRef>
+        </p:style>
+        <p:txBody>
+          <a:bodyPr rtlCol="0" anchor="ctr"/>
+          <a:lstStyle/>
+          <a:p>
+            <a:pPr algn="ctr"/>
+            <a:r>
+              <a:rPr lang="en-US" dirty="0"/>
+              <a:t> 1</a:t>
+            </a:r>
+            <a:endParaRPr lang="pt-BR" dirty="0"/>
+          </a:p>
+        </p:txBody>
+      </p:sp>
+      <p:sp>
+        <p:nvSpPr>
+          <p:cNvPr id="25" name="Retângulo 24">
+            <a:extLst>
+              <a:ext uri="{FF2B5EF4-FFF2-40B4-BE49-F238E27FC236}">
+                <a16:creationId xmlns:a16="http://schemas.microsoft.com/office/drawing/2014/main" id="{711205BF-C9F1-4F8F-BA1F-F35C2B335CA3}"/>
+              </a:ext>
+            </a:extLst>
+          </p:cNvPr>
+          <p:cNvSpPr/>
+          <p:nvPr/>
+        </p:nvSpPr>
+        <p:spPr>
+          <a:xfrm>
+            <a:off x="10749280" y="3256280"/>
+            <a:ext cx="224182" cy="462280"/>
+          </a:xfrm>
+          <a:prstGeom prst="rect">
+            <a:avLst/>
+          </a:prstGeom>
+          <a:solidFill>
+            <a:srgbClr val="0066E3"/>
+          </a:solidFill>
+          <a:ln>
+            <a:noFill/>
+          </a:ln>
+        </p:spPr>
+        <p:style>
+          <a:lnRef idx="2">
+            <a:schemeClr val="accent1">
+              <a:shade val="50000"/>
+            </a:schemeClr>
+          </a:lnRef>
+          <a:fillRef idx="1">
+            <a:schemeClr val="accent1"/>
+          </a:fillRef>
+          <a:effectRef idx="0">
+            <a:schemeClr val="accent1"/>
+          </a:effectRef>
+          <a:fontRef idx="minor">
+            <a:schemeClr val="lt1"/>
+          </a:fontRef>
+        </p:style>
+        <p:txBody>
+          <a:bodyPr rtlCol="0" anchor="ctr"/>
+          <a:lstStyle/>
+          <a:p>
+            <a:pPr algn="ctr"/>
+            <a:endParaRPr lang="pt-BR"/>
+          </a:p>
+        </p:txBody>
+      </p:sp>
     </p:spTree>
     <p:extLst>
       <p:ext uri="{BB962C8B-B14F-4D97-AF65-F5344CB8AC3E}">
@@ -11672,6 +13206,1005 @@
   <p:transition spd="slow">
     <p:push dir="u"/>
   </p:transition>
+  <p:timing>
+    <p:tnLst>
+      <p:par>
+        <p:cTn id="1" dur="indefinite" restart="never" nodeType="tmRoot">
+          <p:childTnLst>
+            <p:seq concurrent="1" nextAc="seek">
+              <p:cTn id="2" dur="indefinite" nodeType="mainSeq">
+                <p:childTnLst>
+                  <p:par>
+                    <p:cTn id="3" fill="hold">
+                      <p:stCondLst>
+                        <p:cond delay="indefinite"/>
+                        <p:cond evt="onBegin" delay="0">
+                          <p:tn val="2"/>
+                        </p:cond>
+                      </p:stCondLst>
+                      <p:childTnLst>
+                        <p:par>
+                          <p:cTn id="4" fill="hold">
+                            <p:stCondLst>
+                              <p:cond delay="0"/>
+                            </p:stCondLst>
+                            <p:childTnLst>
+                              <p:par>
+                                <p:cTn id="5" presetID="6" presetClass="emph" presetSubtype="0" repeatCount="indefinite" accel="38000" decel="16000" autoRev="1" fill="hold" nodeType="withEffect">
+                                  <p:stCondLst>
+                                    <p:cond delay="0"/>
+                                  </p:stCondLst>
+                                  <p:childTnLst>
+                                    <p:animScale>
+                                      <p:cBhvr>
+                                        <p:cTn id="6" dur="10000" fill="hold"/>
+                                        <p:tgtEl>
+                                          <p:spTgt spid="5"/>
+                                        </p:tgtEl>
+                                      </p:cBhvr>
+                                      <p:by x="105000" y="105000"/>
+                                    </p:animScale>
+                                  </p:childTnLst>
+                                </p:cTn>
+                              </p:par>
+                              <p:par>
+                                <p:cTn id="7" presetID="64" presetClass="path" presetSubtype="0" repeatCount="indefinite" accel="50000" decel="50000" autoRev="1" fill="hold" nodeType="withEffect">
+                                  <p:stCondLst>
+                                    <p:cond delay="0"/>
+                                  </p:stCondLst>
+                                  <p:childTnLst>
+                                    <p:animMotion origin="layout" path="M 1.70139E-6 3.45679E-6 L 1.70139E-6 -0.00695 " pathEditMode="relative" rAng="0" ptsTypes="AA">
+                                      <p:cBhvr>
+                                        <p:cTn id="8" dur="3500" fill="hold"/>
+                                        <p:tgtEl>
+                                          <p:spTgt spid="5"/>
+                                        </p:tgtEl>
+                                        <p:attrNameLst>
+                                          <p:attrName>ppt_x</p:attrName>
+                                          <p:attrName>ppt_y</p:attrName>
+                                        </p:attrNameLst>
+                                      </p:cBhvr>
+                                      <p:rCtr x="0" y="-347"/>
+                                    </p:animMotion>
+                                  </p:childTnLst>
+                                </p:cTn>
+                              </p:par>
+                              <p:par>
+                                <p:cTn id="9" presetID="10" presetClass="exit" presetSubtype="0" fill="hold" grpId="0" nodeType="withEffect">
+                                  <p:stCondLst>
+                                    <p:cond delay="250"/>
+                                  </p:stCondLst>
+                                  <p:childTnLst>
+                                    <p:animEffect transition="out" filter="fade">
+                                      <p:cBhvr>
+                                        <p:cTn id="10" dur="500"/>
+                                        <p:tgtEl>
+                                          <p:spTgt spid="9"/>
+                                        </p:tgtEl>
+                                      </p:cBhvr>
+                                    </p:animEffect>
+                                    <p:set>
+                                      <p:cBhvr>
+                                        <p:cTn id="11" dur="1" fill="hold">
+                                          <p:stCondLst>
+                                            <p:cond delay="499"/>
+                                          </p:stCondLst>
+                                        </p:cTn>
+                                        <p:tgtEl>
+                                          <p:spTgt spid="9"/>
+                                        </p:tgtEl>
+                                        <p:attrNameLst>
+                                          <p:attrName>style.visibility</p:attrName>
+                                        </p:attrNameLst>
+                                      </p:cBhvr>
+                                      <p:to>
+                                        <p:strVal val="hidden"/>
+                                      </p:to>
+                                    </p:set>
+                                  </p:childTnLst>
+                                </p:cTn>
+                              </p:par>
+                              <p:par>
+                                <p:cTn id="12" presetID="10" presetClass="exit" presetSubtype="0" fill="hold" grpId="0" nodeType="withEffect">
+                                  <p:stCondLst>
+                                    <p:cond delay="750"/>
+                                  </p:stCondLst>
+                                  <p:childTnLst>
+                                    <p:animEffect transition="out" filter="fade">
+                                      <p:cBhvr>
+                                        <p:cTn id="13" dur="500"/>
+                                        <p:tgtEl>
+                                          <p:spTgt spid="6"/>
+                                        </p:tgtEl>
+                                      </p:cBhvr>
+                                    </p:animEffect>
+                                    <p:set>
+                                      <p:cBhvr>
+                                        <p:cTn id="14" dur="1" fill="hold">
+                                          <p:stCondLst>
+                                            <p:cond delay="499"/>
+                                          </p:stCondLst>
+                                        </p:cTn>
+                                        <p:tgtEl>
+                                          <p:spTgt spid="6"/>
+                                        </p:tgtEl>
+                                        <p:attrNameLst>
+                                          <p:attrName>style.visibility</p:attrName>
+                                        </p:attrNameLst>
+                                      </p:cBhvr>
+                                      <p:to>
+                                        <p:strVal val="hidden"/>
+                                      </p:to>
+                                    </p:set>
+                                  </p:childTnLst>
+                                </p:cTn>
+                              </p:par>
+                              <p:par>
+                                <p:cTn id="15" presetID="10" presetClass="exit" presetSubtype="0" fill="hold" grpId="0" nodeType="withEffect">
+                                  <p:stCondLst>
+                                    <p:cond delay="1250"/>
+                                  </p:stCondLst>
+                                  <p:childTnLst>
+                                    <p:animEffect transition="out" filter="fade">
+                                      <p:cBhvr>
+                                        <p:cTn id="16" dur="500"/>
+                                        <p:tgtEl>
+                                          <p:spTgt spid="7"/>
+                                        </p:tgtEl>
+                                      </p:cBhvr>
+                                    </p:animEffect>
+                                    <p:set>
+                                      <p:cBhvr>
+                                        <p:cTn id="17" dur="1" fill="hold">
+                                          <p:stCondLst>
+                                            <p:cond delay="499"/>
+                                          </p:stCondLst>
+                                        </p:cTn>
+                                        <p:tgtEl>
+                                          <p:spTgt spid="7"/>
+                                        </p:tgtEl>
+                                        <p:attrNameLst>
+                                          <p:attrName>style.visibility</p:attrName>
+                                        </p:attrNameLst>
+                                      </p:cBhvr>
+                                      <p:to>
+                                        <p:strVal val="hidden"/>
+                                      </p:to>
+                                    </p:set>
+                                  </p:childTnLst>
+                                </p:cTn>
+                              </p:par>
+                            </p:childTnLst>
+                          </p:cTn>
+                        </p:par>
+                      </p:childTnLst>
+                    </p:cTn>
+                  </p:par>
+                  <p:par>
+                    <p:cTn id="18" fill="hold">
+                      <p:stCondLst>
+                        <p:cond delay="indefinite"/>
+                      </p:stCondLst>
+                      <p:childTnLst>
+                        <p:par>
+                          <p:cTn id="19" fill="hold">
+                            <p:stCondLst>
+                              <p:cond delay="0"/>
+                            </p:stCondLst>
+                            <p:childTnLst>
+                              <p:par>
+                                <p:cTn id="20" presetID="22" presetClass="exit" presetSubtype="1" fill="hold" grpId="0" nodeType="clickEffect">
+                                  <p:stCondLst>
+                                    <p:cond delay="0"/>
+                                  </p:stCondLst>
+                                  <p:childTnLst>
+                                    <p:animEffect transition="out" filter="wipe(up)">
+                                      <p:cBhvr>
+                                        <p:cTn id="21" dur="500"/>
+                                        <p:tgtEl>
+                                          <p:spTgt spid="10"/>
+                                        </p:tgtEl>
+                                      </p:cBhvr>
+                                    </p:animEffect>
+                                    <p:set>
+                                      <p:cBhvr>
+                                        <p:cTn id="22" dur="1" fill="hold">
+                                          <p:stCondLst>
+                                            <p:cond delay="499"/>
+                                          </p:stCondLst>
+                                        </p:cTn>
+                                        <p:tgtEl>
+                                          <p:spTgt spid="10"/>
+                                        </p:tgtEl>
+                                        <p:attrNameLst>
+                                          <p:attrName>style.visibility</p:attrName>
+                                        </p:attrNameLst>
+                                      </p:cBhvr>
+                                      <p:to>
+                                        <p:strVal val="hidden"/>
+                                      </p:to>
+                                    </p:set>
+                                  </p:childTnLst>
+                                </p:cTn>
+                              </p:par>
+                              <p:par>
+                                <p:cTn id="23" presetID="22" presetClass="exit" presetSubtype="1" fill="hold" grpId="0" nodeType="withEffect">
+                                  <p:stCondLst>
+                                    <p:cond delay="0"/>
+                                  </p:stCondLst>
+                                  <p:childTnLst>
+                                    <p:animEffect transition="out" filter="wipe(up)">
+                                      <p:cBhvr>
+                                        <p:cTn id="24" dur="500"/>
+                                        <p:tgtEl>
+                                          <p:spTgt spid="15"/>
+                                        </p:tgtEl>
+                                      </p:cBhvr>
+                                    </p:animEffect>
+                                    <p:set>
+                                      <p:cBhvr>
+                                        <p:cTn id="25" dur="1" fill="hold">
+                                          <p:stCondLst>
+                                            <p:cond delay="499"/>
+                                          </p:stCondLst>
+                                        </p:cTn>
+                                        <p:tgtEl>
+                                          <p:spTgt spid="15"/>
+                                        </p:tgtEl>
+                                        <p:attrNameLst>
+                                          <p:attrName>style.visibility</p:attrName>
+                                        </p:attrNameLst>
+                                      </p:cBhvr>
+                                      <p:to>
+                                        <p:strVal val="hidden"/>
+                                      </p:to>
+                                    </p:set>
+                                  </p:childTnLst>
+                                </p:cTn>
+                              </p:par>
+                            </p:childTnLst>
+                          </p:cTn>
+                        </p:par>
+                        <p:par>
+                          <p:cTn id="26" fill="hold">
+                            <p:stCondLst>
+                              <p:cond delay="500"/>
+                            </p:stCondLst>
+                            <p:childTnLst>
+                              <p:par>
+                                <p:cTn id="27" presetID="22" presetClass="exit" presetSubtype="1" fill="hold" grpId="0" nodeType="afterEffect">
+                                  <p:stCondLst>
+                                    <p:cond delay="0"/>
+                                  </p:stCondLst>
+                                  <p:childTnLst>
+                                    <p:animEffect transition="out" filter="wipe(up)">
+                                      <p:cBhvr>
+                                        <p:cTn id="28" dur="500"/>
+                                        <p:tgtEl>
+                                          <p:spTgt spid="17"/>
+                                        </p:tgtEl>
+                                      </p:cBhvr>
+                                    </p:animEffect>
+                                    <p:set>
+                                      <p:cBhvr>
+                                        <p:cTn id="29" dur="1" fill="hold">
+                                          <p:stCondLst>
+                                            <p:cond delay="499"/>
+                                          </p:stCondLst>
+                                        </p:cTn>
+                                        <p:tgtEl>
+                                          <p:spTgt spid="17"/>
+                                        </p:tgtEl>
+                                        <p:attrNameLst>
+                                          <p:attrName>style.visibility</p:attrName>
+                                        </p:attrNameLst>
+                                      </p:cBhvr>
+                                      <p:to>
+                                        <p:strVal val="hidden"/>
+                                      </p:to>
+                                    </p:set>
+                                  </p:childTnLst>
+                                </p:cTn>
+                              </p:par>
+                              <p:par>
+                                <p:cTn id="30" presetID="22" presetClass="exit" presetSubtype="1" fill="hold" grpId="0" nodeType="withEffect">
+                                  <p:stCondLst>
+                                    <p:cond delay="250"/>
+                                  </p:stCondLst>
+                                  <p:childTnLst>
+                                    <p:animEffect transition="out" filter="wipe(up)">
+                                      <p:cBhvr>
+                                        <p:cTn id="31" dur="500"/>
+                                        <p:tgtEl>
+                                          <p:spTgt spid="19"/>
+                                        </p:tgtEl>
+                                      </p:cBhvr>
+                                    </p:animEffect>
+                                    <p:set>
+                                      <p:cBhvr>
+                                        <p:cTn id="32" dur="1" fill="hold">
+                                          <p:stCondLst>
+                                            <p:cond delay="499"/>
+                                          </p:stCondLst>
+                                        </p:cTn>
+                                        <p:tgtEl>
+                                          <p:spTgt spid="19"/>
+                                        </p:tgtEl>
+                                        <p:attrNameLst>
+                                          <p:attrName>style.visibility</p:attrName>
+                                        </p:attrNameLst>
+                                      </p:cBhvr>
+                                      <p:to>
+                                        <p:strVal val="hidden"/>
+                                      </p:to>
+                                    </p:set>
+                                  </p:childTnLst>
+                                </p:cTn>
+                              </p:par>
+                            </p:childTnLst>
+                          </p:cTn>
+                        </p:par>
+                        <p:par>
+                          <p:cTn id="33" fill="hold">
+                            <p:stCondLst>
+                              <p:cond delay="1250"/>
+                            </p:stCondLst>
+                            <p:childTnLst>
+                              <p:par>
+                                <p:cTn id="34" presetID="10" presetClass="entr" presetSubtype="0" fill="hold" grpId="2" nodeType="afterEffect">
+                                  <p:stCondLst>
+                                    <p:cond delay="0"/>
+                                  </p:stCondLst>
+                                  <p:childTnLst>
+                                    <p:set>
+                                      <p:cBhvr>
+                                        <p:cTn id="35" dur="1" fill="hold">
+                                          <p:stCondLst>
+                                            <p:cond delay="0"/>
+                                          </p:stCondLst>
+                                        </p:cTn>
+                                        <p:tgtEl>
+                                          <p:spTgt spid="10"/>
+                                        </p:tgtEl>
+                                        <p:attrNameLst>
+                                          <p:attrName>style.visibility</p:attrName>
+                                        </p:attrNameLst>
+                                      </p:cBhvr>
+                                      <p:to>
+                                        <p:strVal val="visible"/>
+                                      </p:to>
+                                    </p:set>
+                                    <p:animEffect transition="in" filter="fade">
+                                      <p:cBhvr>
+                                        <p:cTn id="36" dur="250"/>
+                                        <p:tgtEl>
+                                          <p:spTgt spid="10"/>
+                                        </p:tgtEl>
+                                      </p:cBhvr>
+                                    </p:animEffect>
+                                  </p:childTnLst>
+                                </p:cTn>
+                              </p:par>
+                            </p:childTnLst>
+                          </p:cTn>
+                        </p:par>
+                        <p:par>
+                          <p:cTn id="37" fill="hold">
+                            <p:stCondLst>
+                              <p:cond delay="1500"/>
+                            </p:stCondLst>
+                            <p:childTnLst>
+                              <p:par>
+                                <p:cTn id="38" presetID="10" presetClass="exit" presetSubtype="0" fill="hold" grpId="3" nodeType="afterEffect">
+                                  <p:stCondLst>
+                                    <p:cond delay="0"/>
+                                  </p:stCondLst>
+                                  <p:childTnLst>
+                                    <p:animEffect transition="out" filter="fade">
+                                      <p:cBhvr>
+                                        <p:cTn id="39" dur="500"/>
+                                        <p:tgtEl>
+                                          <p:spTgt spid="10"/>
+                                        </p:tgtEl>
+                                      </p:cBhvr>
+                                    </p:animEffect>
+                                    <p:set>
+                                      <p:cBhvr>
+                                        <p:cTn id="40" dur="1" fill="hold">
+                                          <p:stCondLst>
+                                            <p:cond delay="499"/>
+                                          </p:stCondLst>
+                                        </p:cTn>
+                                        <p:tgtEl>
+                                          <p:spTgt spid="10"/>
+                                        </p:tgtEl>
+                                        <p:attrNameLst>
+                                          <p:attrName>style.visibility</p:attrName>
+                                        </p:attrNameLst>
+                                      </p:cBhvr>
+                                      <p:to>
+                                        <p:strVal val="hidden"/>
+                                      </p:to>
+                                    </p:set>
+                                  </p:childTnLst>
+                                </p:cTn>
+                              </p:par>
+                            </p:childTnLst>
+                          </p:cTn>
+                        </p:par>
+                      </p:childTnLst>
+                    </p:cTn>
+                  </p:par>
+                  <p:par>
+                    <p:cTn id="41" fill="hold">
+                      <p:stCondLst>
+                        <p:cond delay="indefinite"/>
+                      </p:stCondLst>
+                      <p:childTnLst>
+                        <p:par>
+                          <p:cTn id="42" fill="hold">
+                            <p:stCondLst>
+                              <p:cond delay="0"/>
+                            </p:stCondLst>
+                            <p:childTnLst>
+                              <p:par>
+                                <p:cTn id="43" presetID="22" presetClass="exit" presetSubtype="1" fill="hold" grpId="0" nodeType="clickEffect">
+                                  <p:stCondLst>
+                                    <p:cond delay="0"/>
+                                  </p:stCondLst>
+                                  <p:childTnLst>
+                                    <p:animEffect transition="out" filter="wipe(up)">
+                                      <p:cBhvr>
+                                        <p:cTn id="44" dur="500"/>
+                                        <p:tgtEl>
+                                          <p:spTgt spid="11"/>
+                                        </p:tgtEl>
+                                      </p:cBhvr>
+                                    </p:animEffect>
+                                    <p:set>
+                                      <p:cBhvr>
+                                        <p:cTn id="45" dur="1" fill="hold">
+                                          <p:stCondLst>
+                                            <p:cond delay="499"/>
+                                          </p:stCondLst>
+                                        </p:cTn>
+                                        <p:tgtEl>
+                                          <p:spTgt spid="11"/>
+                                        </p:tgtEl>
+                                        <p:attrNameLst>
+                                          <p:attrName>style.visibility</p:attrName>
+                                        </p:attrNameLst>
+                                      </p:cBhvr>
+                                      <p:to>
+                                        <p:strVal val="hidden"/>
+                                      </p:to>
+                                    </p:set>
+                                  </p:childTnLst>
+                                </p:cTn>
+                              </p:par>
+                              <p:par>
+                                <p:cTn id="46" presetID="22" presetClass="exit" presetSubtype="1" fill="hold" grpId="0" nodeType="withEffect">
+                                  <p:stCondLst>
+                                    <p:cond delay="0"/>
+                                  </p:stCondLst>
+                                  <p:childTnLst>
+                                    <p:animEffect transition="out" filter="wipe(up)">
+                                      <p:cBhvr>
+                                        <p:cTn id="47" dur="500"/>
+                                        <p:tgtEl>
+                                          <p:spTgt spid="20"/>
+                                        </p:tgtEl>
+                                      </p:cBhvr>
+                                    </p:animEffect>
+                                    <p:set>
+                                      <p:cBhvr>
+                                        <p:cTn id="48" dur="1" fill="hold">
+                                          <p:stCondLst>
+                                            <p:cond delay="499"/>
+                                          </p:stCondLst>
+                                        </p:cTn>
+                                        <p:tgtEl>
+                                          <p:spTgt spid="20"/>
+                                        </p:tgtEl>
+                                        <p:attrNameLst>
+                                          <p:attrName>style.visibility</p:attrName>
+                                        </p:attrNameLst>
+                                      </p:cBhvr>
+                                      <p:to>
+                                        <p:strVal val="hidden"/>
+                                      </p:to>
+                                    </p:set>
+                                  </p:childTnLst>
+                                </p:cTn>
+                              </p:par>
+                            </p:childTnLst>
+                          </p:cTn>
+                        </p:par>
+                        <p:par>
+                          <p:cTn id="49" fill="hold">
+                            <p:stCondLst>
+                              <p:cond delay="500"/>
+                            </p:stCondLst>
+                            <p:childTnLst>
+                              <p:par>
+                                <p:cTn id="50" presetID="10" presetClass="entr" presetSubtype="0" fill="hold" grpId="1" nodeType="afterEffect">
+                                  <p:stCondLst>
+                                    <p:cond delay="0"/>
+                                  </p:stCondLst>
+                                  <p:childTnLst>
+                                    <p:set>
+                                      <p:cBhvr>
+                                        <p:cTn id="51" dur="1" fill="hold">
+                                          <p:stCondLst>
+                                            <p:cond delay="0"/>
+                                          </p:stCondLst>
+                                        </p:cTn>
+                                        <p:tgtEl>
+                                          <p:spTgt spid="11"/>
+                                        </p:tgtEl>
+                                        <p:attrNameLst>
+                                          <p:attrName>style.visibility</p:attrName>
+                                        </p:attrNameLst>
+                                      </p:cBhvr>
+                                      <p:to>
+                                        <p:strVal val="visible"/>
+                                      </p:to>
+                                    </p:set>
+                                    <p:animEffect transition="in" filter="fade">
+                                      <p:cBhvr>
+                                        <p:cTn id="52" dur="250"/>
+                                        <p:tgtEl>
+                                          <p:spTgt spid="11"/>
+                                        </p:tgtEl>
+                                      </p:cBhvr>
+                                    </p:animEffect>
+                                  </p:childTnLst>
+                                </p:cTn>
+                              </p:par>
+                            </p:childTnLst>
+                          </p:cTn>
+                        </p:par>
+                        <p:par>
+                          <p:cTn id="53" fill="hold">
+                            <p:stCondLst>
+                              <p:cond delay="750"/>
+                            </p:stCondLst>
+                            <p:childTnLst>
+                              <p:par>
+                                <p:cTn id="54" presetID="10" presetClass="exit" presetSubtype="0" fill="hold" grpId="2" nodeType="afterEffect">
+                                  <p:stCondLst>
+                                    <p:cond delay="0"/>
+                                  </p:stCondLst>
+                                  <p:childTnLst>
+                                    <p:animEffect transition="out" filter="fade">
+                                      <p:cBhvr>
+                                        <p:cTn id="55" dur="500"/>
+                                        <p:tgtEl>
+                                          <p:spTgt spid="11"/>
+                                        </p:tgtEl>
+                                      </p:cBhvr>
+                                    </p:animEffect>
+                                    <p:set>
+                                      <p:cBhvr>
+                                        <p:cTn id="56" dur="1" fill="hold">
+                                          <p:stCondLst>
+                                            <p:cond delay="499"/>
+                                          </p:stCondLst>
+                                        </p:cTn>
+                                        <p:tgtEl>
+                                          <p:spTgt spid="11"/>
+                                        </p:tgtEl>
+                                        <p:attrNameLst>
+                                          <p:attrName>style.visibility</p:attrName>
+                                        </p:attrNameLst>
+                                      </p:cBhvr>
+                                      <p:to>
+                                        <p:strVal val="hidden"/>
+                                      </p:to>
+                                    </p:set>
+                                  </p:childTnLst>
+                                </p:cTn>
+                              </p:par>
+                            </p:childTnLst>
+                          </p:cTn>
+                        </p:par>
+                      </p:childTnLst>
+                    </p:cTn>
+                  </p:par>
+                  <p:par>
+                    <p:cTn id="57" fill="hold">
+                      <p:stCondLst>
+                        <p:cond delay="indefinite"/>
+                      </p:stCondLst>
+                      <p:childTnLst>
+                        <p:par>
+                          <p:cTn id="58" fill="hold">
+                            <p:stCondLst>
+                              <p:cond delay="0"/>
+                            </p:stCondLst>
+                            <p:childTnLst>
+                              <p:par>
+                                <p:cTn id="59" presetID="10" presetClass="entr" presetSubtype="0" fill="hold" nodeType="clickEffect">
+                                  <p:stCondLst>
+                                    <p:cond delay="0"/>
+                                  </p:stCondLst>
+                                  <p:childTnLst>
+                                    <p:set>
+                                      <p:cBhvr>
+                                        <p:cTn id="60" dur="1" fill="hold">
+                                          <p:stCondLst>
+                                            <p:cond delay="0"/>
+                                          </p:stCondLst>
+                                        </p:cTn>
+                                        <p:tgtEl>
+                                          <p:spTgt spid="22"/>
+                                        </p:tgtEl>
+                                        <p:attrNameLst>
+                                          <p:attrName>style.visibility</p:attrName>
+                                        </p:attrNameLst>
+                                      </p:cBhvr>
+                                      <p:to>
+                                        <p:strVal val="visible"/>
+                                      </p:to>
+                                    </p:set>
+                                    <p:animEffect transition="in" filter="fade">
+                                      <p:cBhvr>
+                                        <p:cTn id="61" dur="500"/>
+                                        <p:tgtEl>
+                                          <p:spTgt spid="22"/>
+                                        </p:tgtEl>
+                                      </p:cBhvr>
+                                    </p:animEffect>
+                                  </p:childTnLst>
+                                </p:cTn>
+                              </p:par>
+                              <p:par>
+                                <p:cTn id="62" presetID="26" presetClass="emph" presetSubtype="0" fill="hold" nodeType="withEffect">
+                                  <p:stCondLst>
+                                    <p:cond delay="0"/>
+                                  </p:stCondLst>
+                                  <p:childTnLst>
+                                    <p:animEffect transition="out" filter="fade">
+                                      <p:cBhvr>
+                                        <p:cTn id="63" dur="500" tmFilter="0, 0; .2, .5; .8, .5; 1, 0"/>
+                                        <p:tgtEl>
+                                          <p:spTgt spid="22"/>
+                                        </p:tgtEl>
+                                      </p:cBhvr>
+                                    </p:animEffect>
+                                    <p:animScale>
+                                      <p:cBhvr>
+                                        <p:cTn id="64" dur="250" autoRev="1" fill="hold"/>
+                                        <p:tgtEl>
+                                          <p:spTgt spid="22"/>
+                                        </p:tgtEl>
+                                      </p:cBhvr>
+                                      <p:by x="105000" y="105000"/>
+                                    </p:animScale>
+                                  </p:childTnLst>
+                                </p:cTn>
+                              </p:par>
+                            </p:childTnLst>
+                          </p:cTn>
+                        </p:par>
+                      </p:childTnLst>
+                    </p:cTn>
+                  </p:par>
+                  <p:par>
+                    <p:cTn id="65" fill="hold">
+                      <p:stCondLst>
+                        <p:cond delay="indefinite"/>
+                      </p:stCondLst>
+                      <p:childTnLst>
+                        <p:par>
+                          <p:cTn id="66" fill="hold">
+                            <p:stCondLst>
+                              <p:cond delay="0"/>
+                            </p:stCondLst>
+                            <p:childTnLst>
+                              <p:par>
+                                <p:cTn id="67" presetID="2" presetClass="exit" presetSubtype="2" decel="100000" fill="hold" grpId="0" nodeType="clickEffect">
+                                  <p:stCondLst>
+                                    <p:cond delay="0"/>
+                                  </p:stCondLst>
+                                  <p:childTnLst>
+                                    <p:anim calcmode="lin" valueType="num">
+                                      <p:cBhvr additive="base">
+                                        <p:cTn id="68" dur="500"/>
+                                        <p:tgtEl>
+                                          <p:spTgt spid="24"/>
+                                        </p:tgtEl>
+                                        <p:attrNameLst>
+                                          <p:attrName>ppt_x</p:attrName>
+                                        </p:attrNameLst>
+                                      </p:cBhvr>
+                                      <p:tavLst>
+                                        <p:tav tm="0">
+                                          <p:val>
+                                            <p:strVal val="ppt_x"/>
+                                          </p:val>
+                                        </p:tav>
+                                        <p:tav tm="100000">
+                                          <p:val>
+                                            <p:strVal val="1+ppt_w/2"/>
+                                          </p:val>
+                                        </p:tav>
+                                      </p:tavLst>
+                                    </p:anim>
+                                    <p:anim calcmode="lin" valueType="num">
+                                      <p:cBhvr additive="base">
+                                        <p:cTn id="69" dur="500"/>
+                                        <p:tgtEl>
+                                          <p:spTgt spid="24"/>
+                                        </p:tgtEl>
+                                        <p:attrNameLst>
+                                          <p:attrName>ppt_y</p:attrName>
+                                        </p:attrNameLst>
+                                      </p:cBhvr>
+                                      <p:tavLst>
+                                        <p:tav tm="0">
+                                          <p:val>
+                                            <p:strVal val="ppt_y"/>
+                                          </p:val>
+                                        </p:tav>
+                                        <p:tav tm="100000">
+                                          <p:val>
+                                            <p:strVal val="ppt_y"/>
+                                          </p:val>
+                                        </p:tav>
+                                      </p:tavLst>
+                                    </p:anim>
+                                    <p:set>
+                                      <p:cBhvr>
+                                        <p:cTn id="70" dur="1" fill="hold">
+                                          <p:stCondLst>
+                                            <p:cond delay="499"/>
+                                          </p:stCondLst>
+                                        </p:cTn>
+                                        <p:tgtEl>
+                                          <p:spTgt spid="24"/>
+                                        </p:tgtEl>
+                                        <p:attrNameLst>
+                                          <p:attrName>style.visibility</p:attrName>
+                                        </p:attrNameLst>
+                                      </p:cBhvr>
+                                      <p:to>
+                                        <p:strVal val="hidden"/>
+                                      </p:to>
+                                    </p:set>
+                                  </p:childTnLst>
+                                </p:cTn>
+                              </p:par>
+                              <p:par>
+                                <p:cTn id="71" presetID="35" presetClass="path" presetSubtype="0" decel="69000" fill="hold" nodeType="withEffect">
+                                  <p:stCondLst>
+                                    <p:cond delay="0"/>
+                                  </p:stCondLst>
+                                  <p:childTnLst>
+                                    <p:animMotion origin="layout" path="M -2.77778E-6 1.79012E-6 L -0.1378 1.79012E-6 " pathEditMode="relative" rAng="0" ptsTypes="AA">
+                                      <p:cBhvr>
+                                        <p:cTn id="72" dur="2000" fill="hold"/>
+                                        <p:tgtEl>
+                                          <p:spTgt spid="3"/>
+                                        </p:tgtEl>
+                                        <p:attrNameLst>
+                                          <p:attrName>ppt_x</p:attrName>
+                                          <p:attrName>ppt_y</p:attrName>
+                                        </p:attrNameLst>
+                                      </p:cBhvr>
+                                      <p:rCtr x="-6890" y="0"/>
+                                    </p:animMotion>
+                                  </p:childTnLst>
+                                </p:cTn>
+                              </p:par>
+                              <p:par>
+                                <p:cTn id="73" presetID="1" presetClass="exit" presetSubtype="0" fill="hold" grpId="0" nodeType="withEffect">
+                                  <p:stCondLst>
+                                    <p:cond delay="0"/>
+                                  </p:stCondLst>
+                                  <p:childTnLst>
+                                    <p:set>
+                                      <p:cBhvr>
+                                        <p:cTn id="74" dur="1" fill="hold">
+                                          <p:stCondLst>
+                                            <p:cond delay="0"/>
+                                          </p:stCondLst>
+                                        </p:cTn>
+                                        <p:tgtEl>
+                                          <p:spTgt spid="25"/>
+                                        </p:tgtEl>
+                                        <p:attrNameLst>
+                                          <p:attrName>style.visibility</p:attrName>
+                                        </p:attrNameLst>
+                                      </p:cBhvr>
+                                      <p:to>
+                                        <p:strVal val="hidden"/>
+                                      </p:to>
+                                    </p:set>
+                                  </p:childTnLst>
+                                </p:cTn>
+                              </p:par>
+                              <p:par>
+                                <p:cTn id="75" presetID="35" presetClass="path" presetSubtype="0" accel="50000" decel="50000" fill="hold" nodeType="withEffect">
+                                  <p:stCondLst>
+                                    <p:cond delay="0"/>
+                                  </p:stCondLst>
+                                  <p:childTnLst>
+                                    <p:animMotion origin="layout" path="M 1.70139E-6 3.45679E-6 L -0.13781 3.45679E-6 " pathEditMode="relative" rAng="0" ptsTypes="AA">
+                                      <p:cBhvr>
+                                        <p:cTn id="76" dur="2000" fill="hold"/>
+                                        <p:tgtEl>
+                                          <p:spTgt spid="5"/>
+                                        </p:tgtEl>
+                                        <p:attrNameLst>
+                                          <p:attrName>ppt_x</p:attrName>
+                                          <p:attrName>ppt_y</p:attrName>
+                                        </p:attrNameLst>
+                                      </p:cBhvr>
+                                      <p:rCtr x="-6890" y="0"/>
+                                    </p:animMotion>
+                                  </p:childTnLst>
+                                </p:cTn>
+                              </p:par>
+                              <p:par>
+                                <p:cTn id="77" presetID="35" presetClass="path" presetSubtype="0" accel="50000" decel="50000" fill="hold" grpId="1" nodeType="withEffect">
+                                  <p:stCondLst>
+                                    <p:cond delay="0"/>
+                                  </p:stCondLst>
+                                  <p:childTnLst>
+                                    <p:animMotion origin="layout" path="M 1.70139E-6 4.5679E-6 L -0.13781 4.5679E-6 " pathEditMode="relative" rAng="0" ptsTypes="AA">
+                                      <p:cBhvr>
+                                        <p:cTn id="78" dur="2000" fill="hold"/>
+                                        <p:tgtEl>
+                                          <p:spTgt spid="6"/>
+                                        </p:tgtEl>
+                                        <p:attrNameLst>
+                                          <p:attrName>ppt_x</p:attrName>
+                                          <p:attrName>ppt_y</p:attrName>
+                                        </p:attrNameLst>
+                                      </p:cBhvr>
+                                      <p:rCtr x="-6890" y="0"/>
+                                    </p:animMotion>
+                                  </p:childTnLst>
+                                </p:cTn>
+                              </p:par>
+                              <p:par>
+                                <p:cTn id="79" presetID="35" presetClass="path" presetSubtype="0" accel="50000" decel="50000" fill="hold" grpId="1" nodeType="withEffect">
+                                  <p:stCondLst>
+                                    <p:cond delay="0"/>
+                                  </p:stCondLst>
+                                  <p:childTnLst>
+                                    <p:animMotion origin="layout" path="M 1.70139E-6 4.25926E-6 L -0.13781 4.25926E-6 " pathEditMode="relative" rAng="0" ptsTypes="AA">
+                                      <p:cBhvr>
+                                        <p:cTn id="80" dur="2000" fill="hold"/>
+                                        <p:tgtEl>
+                                          <p:spTgt spid="7"/>
+                                        </p:tgtEl>
+                                        <p:attrNameLst>
+                                          <p:attrName>ppt_x</p:attrName>
+                                          <p:attrName>ppt_y</p:attrName>
+                                        </p:attrNameLst>
+                                      </p:cBhvr>
+                                      <p:rCtr x="-6890" y="0"/>
+                                    </p:animMotion>
+                                  </p:childTnLst>
+                                </p:cTn>
+                              </p:par>
+                              <p:par>
+                                <p:cTn id="81" presetID="35" presetClass="path" presetSubtype="0" accel="50000" decel="50000" fill="hold" grpId="1" nodeType="withEffect">
+                                  <p:stCondLst>
+                                    <p:cond delay="0"/>
+                                  </p:stCondLst>
+                                  <p:childTnLst>
+                                    <p:animMotion origin="layout" path="M -2.77778E-6 -3.08642E-7 L -0.13748 -3.08642E-7 " pathEditMode="relative" rAng="0" ptsTypes="AA">
+                                      <p:cBhvr>
+                                        <p:cTn id="82" dur="2000" fill="hold"/>
+                                        <p:tgtEl>
+                                          <p:spTgt spid="9"/>
+                                        </p:tgtEl>
+                                        <p:attrNameLst>
+                                          <p:attrName>ppt_x</p:attrName>
+                                          <p:attrName>ppt_y</p:attrName>
+                                        </p:attrNameLst>
+                                      </p:cBhvr>
+                                      <p:rCtr x="-6879" y="0"/>
+                                    </p:animMotion>
+                                  </p:childTnLst>
+                                </p:cTn>
+                              </p:par>
+                              <p:par>
+                                <p:cTn id="83" presetID="35" presetClass="path" presetSubtype="0" accel="50000" decel="50000" fill="hold" grpId="3" nodeType="withEffect">
+                                  <p:stCondLst>
+                                    <p:cond delay="0"/>
+                                  </p:stCondLst>
+                                  <p:childTnLst>
+                                    <p:animMotion origin="layout" path="M 3.40278E-6 -3.82716E-6 L -0.14887 -3.82716E-6 " pathEditMode="relative" rAng="0" ptsTypes="AA">
+                                      <p:cBhvr>
+                                        <p:cTn id="84" dur="2000" fill="hold"/>
+                                        <p:tgtEl>
+                                          <p:spTgt spid="11"/>
+                                        </p:tgtEl>
+                                        <p:attrNameLst>
+                                          <p:attrName>ppt_x</p:attrName>
+                                          <p:attrName>ppt_y</p:attrName>
+                                        </p:attrNameLst>
+                                      </p:cBhvr>
+                                      <p:rCtr x="-7444" y="0"/>
+                                    </p:animMotion>
+                                  </p:childTnLst>
+                                </p:cTn>
+                              </p:par>
+                              <p:par>
+                                <p:cTn id="85" presetID="35" presetClass="path" presetSubtype="0" accel="50000" decel="50000" fill="hold" nodeType="withEffect">
+                                  <p:stCondLst>
+                                    <p:cond delay="0"/>
+                                  </p:stCondLst>
+                                  <p:childTnLst>
+                                    <p:animMotion origin="layout" path="M -1.73611E-7 -4.50617E-6 L -0.14073 -4.50617E-6 " pathEditMode="relative" rAng="0" ptsTypes="AA">
+                                      <p:cBhvr>
+                                        <p:cTn id="86" dur="2000" fill="hold"/>
+                                        <p:tgtEl>
+                                          <p:spTgt spid="22"/>
+                                        </p:tgtEl>
+                                        <p:attrNameLst>
+                                          <p:attrName>ppt_x</p:attrName>
+                                          <p:attrName>ppt_y</p:attrName>
+                                        </p:attrNameLst>
+                                      </p:cBhvr>
+                                      <p:rCtr x="-7042" y="0"/>
+                                    </p:animMotion>
+                                  </p:childTnLst>
+                                </p:cTn>
+                              </p:par>
+                            </p:childTnLst>
+                          </p:cTn>
+                        </p:par>
+                      </p:childTnLst>
+                    </p:cTn>
+                  </p:par>
+                </p:childTnLst>
+              </p:cTn>
+              <p:prevCondLst>
+                <p:cond evt="onPrev" delay="0">
+                  <p:tgtEl>
+                    <p:sldTgt/>
+                  </p:tgtEl>
+                </p:cond>
+              </p:prevCondLst>
+              <p:nextCondLst>
+                <p:cond evt="onNext" delay="0">
+                  <p:tgtEl>
+                    <p:sldTgt/>
+                  </p:tgtEl>
+                </p:cond>
+              </p:nextCondLst>
+            </p:seq>
+          </p:childTnLst>
+        </p:cTn>
+      </p:par>
+    </p:tnLst>
+    <p:bldLst>
+      <p:bldP spid="6" grpId="0" animBg="1"/>
+      <p:bldP spid="6" grpId="1" animBg="1"/>
+      <p:bldP spid="7" grpId="0" animBg="1"/>
+      <p:bldP spid="7" grpId="1" animBg="1"/>
+      <p:bldP spid="9" grpId="0" animBg="1"/>
+      <p:bldP spid="9" grpId="1" animBg="1"/>
+      <p:bldP spid="10" grpId="0" animBg="1"/>
+      <p:bldP spid="10" grpId="2" animBg="1"/>
+      <p:bldP spid="10" grpId="3" animBg="1"/>
+      <p:bldP spid="11" grpId="0" animBg="1"/>
+      <p:bldP spid="11" grpId="1" animBg="1"/>
+      <p:bldP spid="11" grpId="2" animBg="1"/>
+      <p:bldP spid="11" grpId="3" animBg="1"/>
+      <p:bldP spid="15" grpId="0" animBg="1"/>
+      <p:bldP spid="17" grpId="0" animBg="1"/>
+      <p:bldP spid="19" grpId="0" animBg="1"/>
+      <p:bldP spid="20" grpId="0" animBg="1"/>
+      <p:bldP spid="24" grpId="0" animBg="1"/>
+      <p:bldP spid="25" grpId="0" animBg="1"/>
+    </p:bldLst>
+  </p:timing>
 </p:sld>
 </file>
 

</xml_diff>